<commit_message>
ver 0.89.8 vxlCamera.setElevation corrected for cameras of type ORBITING. Positive angles correspond to camera *elevation*
</commit_message>
<xml_diff>
--- a/docs/diagrams/diagrams.pptx
+++ b/docs/diagrams/diagrams.pptx
@@ -7,6 +7,7 @@
   <p:sldIdLst>
     <p:sldId id="257" r:id="rId2"/>
     <p:sldId id="258" r:id="rId3"/>
+    <p:sldId id="259" r:id="rId4"/>
   </p:sldIdLst>
   <p:sldSz cx="9144000" cy="6858000" type="screen4x3"/>
   <p:notesSz cx="6858000" cy="9144000"/>
@@ -289,7 +290,7 @@
           <a:p>
             <a:fld id="{DCABABE5-81F0-42D2-92CC-9E94DBEAC52B}" type="datetimeFigureOut">
               <a:rPr lang="en-CA" smtClean="0"/>
-              <a:t>08-Feb-12</a:t>
+              <a:t>19-Mar-14</a:t>
             </a:fld>
             <a:endParaRPr lang="en-CA"/>
           </a:p>
@@ -459,7 +460,7 @@
           <a:p>
             <a:fld id="{DCABABE5-81F0-42D2-92CC-9E94DBEAC52B}" type="datetimeFigureOut">
               <a:rPr lang="en-CA" smtClean="0"/>
-              <a:t>08-Feb-12</a:t>
+              <a:t>19-Mar-14</a:t>
             </a:fld>
             <a:endParaRPr lang="en-CA"/>
           </a:p>
@@ -639,7 +640,7 @@
           <a:p>
             <a:fld id="{DCABABE5-81F0-42D2-92CC-9E94DBEAC52B}" type="datetimeFigureOut">
               <a:rPr lang="en-CA" smtClean="0"/>
-              <a:t>08-Feb-12</a:t>
+              <a:t>19-Mar-14</a:t>
             </a:fld>
             <a:endParaRPr lang="en-CA"/>
           </a:p>
@@ -809,7 +810,7 @@
           <a:p>
             <a:fld id="{DCABABE5-81F0-42D2-92CC-9E94DBEAC52B}" type="datetimeFigureOut">
               <a:rPr lang="en-CA" smtClean="0"/>
-              <a:t>08-Feb-12</a:t>
+              <a:t>19-Mar-14</a:t>
             </a:fld>
             <a:endParaRPr lang="en-CA"/>
           </a:p>
@@ -1055,7 +1056,7 @@
           <a:p>
             <a:fld id="{DCABABE5-81F0-42D2-92CC-9E94DBEAC52B}" type="datetimeFigureOut">
               <a:rPr lang="en-CA" smtClean="0"/>
-              <a:t>08-Feb-12</a:t>
+              <a:t>19-Mar-14</a:t>
             </a:fld>
             <a:endParaRPr lang="en-CA"/>
           </a:p>
@@ -1343,7 +1344,7 @@
           <a:p>
             <a:fld id="{DCABABE5-81F0-42D2-92CC-9E94DBEAC52B}" type="datetimeFigureOut">
               <a:rPr lang="en-CA" smtClean="0"/>
-              <a:t>08-Feb-12</a:t>
+              <a:t>19-Mar-14</a:t>
             </a:fld>
             <a:endParaRPr lang="en-CA"/>
           </a:p>
@@ -1765,7 +1766,7 @@
           <a:p>
             <a:fld id="{DCABABE5-81F0-42D2-92CC-9E94DBEAC52B}" type="datetimeFigureOut">
               <a:rPr lang="en-CA" smtClean="0"/>
-              <a:t>08-Feb-12</a:t>
+              <a:t>19-Mar-14</a:t>
             </a:fld>
             <a:endParaRPr lang="en-CA"/>
           </a:p>
@@ -1883,7 +1884,7 @@
           <a:p>
             <a:fld id="{DCABABE5-81F0-42D2-92CC-9E94DBEAC52B}" type="datetimeFigureOut">
               <a:rPr lang="en-CA" smtClean="0"/>
-              <a:t>08-Feb-12</a:t>
+              <a:t>19-Mar-14</a:t>
             </a:fld>
             <a:endParaRPr lang="en-CA"/>
           </a:p>
@@ -1978,7 +1979,7 @@
           <a:p>
             <a:fld id="{DCABABE5-81F0-42D2-92CC-9E94DBEAC52B}" type="datetimeFigureOut">
               <a:rPr lang="en-CA" smtClean="0"/>
-              <a:t>08-Feb-12</a:t>
+              <a:t>19-Mar-14</a:t>
             </a:fld>
             <a:endParaRPr lang="en-CA"/>
           </a:p>
@@ -2255,7 +2256,7 @@
           <a:p>
             <a:fld id="{DCABABE5-81F0-42D2-92CC-9E94DBEAC52B}" type="datetimeFigureOut">
               <a:rPr lang="en-CA" smtClean="0"/>
-              <a:t>08-Feb-12</a:t>
+              <a:t>19-Mar-14</a:t>
             </a:fld>
             <a:endParaRPr lang="en-CA"/>
           </a:p>
@@ -2508,7 +2509,7 @@
           <a:p>
             <a:fld id="{DCABABE5-81F0-42D2-92CC-9E94DBEAC52B}" type="datetimeFigureOut">
               <a:rPr lang="en-CA" smtClean="0"/>
-              <a:t>08-Feb-12</a:t>
+              <a:t>19-Mar-14</a:t>
             </a:fld>
             <a:endParaRPr lang="en-CA"/>
           </a:p>
@@ -2721,7 +2722,7 @@
           <a:p>
             <a:fld id="{DCABABE5-81F0-42D2-92CC-9E94DBEAC52B}" type="datetimeFigureOut">
               <a:rPr lang="en-CA" smtClean="0"/>
-              <a:t>08-Feb-12</a:t>
+              <a:t>19-Mar-14</a:t>
             </a:fld>
             <a:endParaRPr lang="en-CA"/>
           </a:p>
@@ -3448,15 +3449,7 @@
                     <a:schemeClr val="accent1"/>
                   </a:solidFill>
                 </a:rPr>
-                <a:t>A simple voxelent </a:t>
-              </a:r>
-              <a:r>
-                <a:rPr lang="en-CA" sz="2800" smtClean="0">
-                  <a:solidFill>
-                    <a:schemeClr val="accent1"/>
-                  </a:solidFill>
-                </a:rPr>
-                <a:t>scene</a:t>
+                <a:t>A simple voxelent scene</a:t>
               </a:r>
               <a:endParaRPr lang="en-CA" sz="2800">
                 <a:solidFill>
@@ -3839,10 +3832,6 @@
                 </a:rPr>
                 <a:t>='runVoxelentApp()'&gt;</a:t>
               </a:r>
-              <a:endParaRPr lang="en-CA" sz="1400">
-                <a:latin typeface="Courier New" pitchFamily="49" charset="0"/>
-                <a:cs typeface="Courier New" pitchFamily="49" charset="0"/>
-              </a:endParaRPr>
             </a:p>
           </p:txBody>
         </p:sp>
@@ -3884,10 +3873,2615 @@
           <a:chExt cx="0" cy="0"/>
         </a:xfrm>
       </p:grpSpPr>
+      <p:grpSp>
+        <p:nvGrpSpPr>
+          <p:cNvPr id="2" name="Group 1"/>
+          <p:cNvGrpSpPr/>
+          <p:nvPr/>
+        </p:nvGrpSpPr>
+        <p:grpSpPr>
+          <a:xfrm>
+            <a:off x="1943100" y="834886"/>
+            <a:ext cx="3374962" cy="2174538"/>
+            <a:chOff x="1943100" y="834886"/>
+            <a:chExt cx="3374962" cy="2174538"/>
+          </a:xfrm>
+        </p:grpSpPr>
+        <p:cxnSp>
+          <p:nvCxnSpPr>
+            <p:cNvPr id="3" name="Straight Arrow Connector 2"/>
+            <p:cNvCxnSpPr/>
+            <p:nvPr/>
+          </p:nvCxnSpPr>
+          <p:spPr>
+            <a:xfrm flipV="1">
+              <a:off x="2590800" y="1143000"/>
+              <a:ext cx="0" cy="1066800"/>
+            </a:xfrm>
+            <a:prstGeom prst="straightConnector1">
+              <a:avLst/>
+            </a:prstGeom>
+            <a:ln>
+              <a:solidFill>
+                <a:schemeClr val="tx1">
+                  <a:lumMod val="50000"/>
+                  <a:lumOff val="50000"/>
+                </a:schemeClr>
+              </a:solidFill>
+              <a:tailEnd type="arrow"/>
+            </a:ln>
+          </p:spPr>
+          <p:style>
+            <a:lnRef idx="1">
+              <a:schemeClr val="accent1"/>
+            </a:lnRef>
+            <a:fillRef idx="0">
+              <a:schemeClr val="accent1"/>
+            </a:fillRef>
+            <a:effectRef idx="0">
+              <a:schemeClr val="accent1"/>
+            </a:effectRef>
+            <a:fontRef idx="minor">
+              <a:schemeClr val="tx1"/>
+            </a:fontRef>
+          </p:style>
+        </p:cxnSp>
+        <p:cxnSp>
+          <p:nvCxnSpPr>
+            <p:cNvPr id="4" name="Straight Arrow Connector 3"/>
+            <p:cNvCxnSpPr/>
+            <p:nvPr/>
+          </p:nvCxnSpPr>
+          <p:spPr>
+            <a:xfrm>
+              <a:off x="2590800" y="2209800"/>
+              <a:ext cx="2438400" cy="0"/>
+            </a:xfrm>
+            <a:prstGeom prst="straightConnector1">
+              <a:avLst/>
+            </a:prstGeom>
+            <a:ln>
+              <a:solidFill>
+                <a:schemeClr val="tx1">
+                  <a:lumMod val="50000"/>
+                  <a:lumOff val="50000"/>
+                </a:schemeClr>
+              </a:solidFill>
+              <a:tailEnd type="arrow"/>
+            </a:ln>
+          </p:spPr>
+          <p:style>
+            <a:lnRef idx="1">
+              <a:schemeClr val="accent1"/>
+            </a:lnRef>
+            <a:fillRef idx="0">
+              <a:schemeClr val="accent1"/>
+            </a:fillRef>
+            <a:effectRef idx="0">
+              <a:schemeClr val="accent1"/>
+            </a:effectRef>
+            <a:fontRef idx="minor">
+              <a:schemeClr val="tx1"/>
+            </a:fontRef>
+          </p:style>
+        </p:cxnSp>
+        <p:cxnSp>
+          <p:nvCxnSpPr>
+            <p:cNvPr id="5" name="Straight Arrow Connector 4"/>
+            <p:cNvCxnSpPr/>
+            <p:nvPr/>
+          </p:nvCxnSpPr>
+          <p:spPr>
+            <a:xfrm flipH="1">
+              <a:off x="1943100" y="2209800"/>
+              <a:ext cx="647700" cy="582692"/>
+            </a:xfrm>
+            <a:prstGeom prst="straightConnector1">
+              <a:avLst/>
+            </a:prstGeom>
+            <a:ln>
+              <a:solidFill>
+                <a:schemeClr val="tx1">
+                  <a:lumMod val="50000"/>
+                  <a:lumOff val="50000"/>
+                </a:schemeClr>
+              </a:solidFill>
+              <a:tailEnd type="arrow"/>
+            </a:ln>
+          </p:spPr>
+          <p:style>
+            <a:lnRef idx="1">
+              <a:schemeClr val="accent1"/>
+            </a:lnRef>
+            <a:fillRef idx="0">
+              <a:schemeClr val="accent1"/>
+            </a:fillRef>
+            <a:effectRef idx="0">
+              <a:schemeClr val="accent1"/>
+            </a:effectRef>
+            <a:fontRef idx="minor">
+              <a:schemeClr val="tx1"/>
+            </a:fontRef>
+          </p:style>
+        </p:cxnSp>
+        <p:grpSp>
+          <p:nvGrpSpPr>
+            <p:cNvPr id="6" name="Group 5"/>
+            <p:cNvGrpSpPr/>
+            <p:nvPr/>
+          </p:nvGrpSpPr>
+          <p:grpSpPr>
+            <a:xfrm>
+              <a:off x="2847684" y="1351267"/>
+              <a:ext cx="636270" cy="304800"/>
+              <a:chOff x="2133600" y="3505200"/>
+              <a:chExt cx="979170" cy="457200"/>
+            </a:xfrm>
+            <a:solidFill>
+              <a:schemeClr val="accent1"/>
+            </a:solidFill>
+          </p:grpSpPr>
+          <p:sp>
+            <p:nvSpPr>
+              <p:cNvPr id="22" name="Rectangle 21"/>
+              <p:cNvSpPr/>
+              <p:nvPr/>
+            </p:nvSpPr>
+            <p:spPr>
+              <a:xfrm>
+                <a:off x="2133600" y="3505200"/>
+                <a:ext cx="685800" cy="457200"/>
+              </a:xfrm>
+              <a:prstGeom prst="rect">
+                <a:avLst/>
+              </a:prstGeom>
+              <a:solidFill>
+                <a:schemeClr val="bg1">
+                  <a:lumMod val="50000"/>
+                </a:schemeClr>
+              </a:solidFill>
+              <a:ln>
+                <a:noFill/>
+              </a:ln>
+            </p:spPr>
+            <p:style>
+              <a:lnRef idx="2">
+                <a:schemeClr val="accent1">
+                  <a:shade val="50000"/>
+                </a:schemeClr>
+              </a:lnRef>
+              <a:fillRef idx="1">
+                <a:schemeClr val="accent1"/>
+              </a:fillRef>
+              <a:effectRef idx="0">
+                <a:schemeClr val="accent1"/>
+              </a:effectRef>
+              <a:fontRef idx="minor">
+                <a:schemeClr val="lt1"/>
+              </a:fontRef>
+            </p:style>
+            <p:txBody>
+              <a:bodyPr rtlCol="0" anchor="ctr"/>
+              <a:lstStyle/>
+              <a:p>
+                <a:pPr algn="ctr"/>
+                <a:endParaRPr lang="en-CA"/>
+              </a:p>
+            </p:txBody>
+          </p:sp>
+          <p:sp>
+            <p:nvSpPr>
+              <p:cNvPr id="23" name="Isosceles Triangle 22"/>
+              <p:cNvSpPr/>
+              <p:nvPr/>
+            </p:nvSpPr>
+            <p:spPr>
+              <a:xfrm rot="16200000">
+                <a:off x="2655570" y="3505200"/>
+                <a:ext cx="457200" cy="457200"/>
+              </a:xfrm>
+              <a:prstGeom prst="triangle">
+                <a:avLst/>
+              </a:prstGeom>
+              <a:solidFill>
+                <a:schemeClr val="bg1">
+                  <a:lumMod val="50000"/>
+                </a:schemeClr>
+              </a:solidFill>
+              <a:ln>
+                <a:noFill/>
+              </a:ln>
+            </p:spPr>
+            <p:style>
+              <a:lnRef idx="2">
+                <a:schemeClr val="accent1">
+                  <a:shade val="50000"/>
+                </a:schemeClr>
+              </a:lnRef>
+              <a:fillRef idx="1">
+                <a:schemeClr val="accent1"/>
+              </a:fillRef>
+              <a:effectRef idx="0">
+                <a:schemeClr val="accent1"/>
+              </a:effectRef>
+              <a:fontRef idx="minor">
+                <a:schemeClr val="lt1"/>
+              </a:fontRef>
+            </p:style>
+            <p:txBody>
+              <a:bodyPr rtlCol="0" anchor="ctr"/>
+              <a:lstStyle/>
+              <a:p>
+                <a:pPr algn="ctr"/>
+                <a:endParaRPr lang="en-CA"/>
+              </a:p>
+            </p:txBody>
+          </p:sp>
+        </p:grpSp>
+        <p:grpSp>
+          <p:nvGrpSpPr>
+            <p:cNvPr id="7" name="Group 6"/>
+            <p:cNvGrpSpPr/>
+            <p:nvPr/>
+          </p:nvGrpSpPr>
+          <p:grpSpPr>
+            <a:xfrm>
+              <a:off x="2837418" y="1175266"/>
+              <a:ext cx="656802" cy="656802"/>
+              <a:chOff x="2924598" y="3348347"/>
+              <a:chExt cx="656802" cy="656802"/>
+            </a:xfrm>
+          </p:grpSpPr>
+          <p:cxnSp>
+            <p:nvCxnSpPr>
+              <p:cNvPr id="20" name="Straight Connector 19"/>
+              <p:cNvCxnSpPr/>
+              <p:nvPr/>
+            </p:nvCxnSpPr>
+            <p:spPr>
+              <a:xfrm>
+                <a:off x="2924598" y="3676747"/>
+                <a:ext cx="656802" cy="0"/>
+              </a:xfrm>
+              <a:prstGeom prst="line">
+                <a:avLst/>
+              </a:prstGeom>
+              <a:ln>
+                <a:solidFill>
+                  <a:schemeClr val="tx1"/>
+                </a:solidFill>
+                <a:prstDash val="lgDash"/>
+              </a:ln>
+            </p:spPr>
+            <p:style>
+              <a:lnRef idx="1">
+                <a:schemeClr val="accent1"/>
+              </a:lnRef>
+              <a:fillRef idx="0">
+                <a:schemeClr val="accent1"/>
+              </a:fillRef>
+              <a:effectRef idx="0">
+                <a:schemeClr val="accent1"/>
+              </a:effectRef>
+              <a:fontRef idx="minor">
+                <a:schemeClr val="tx1"/>
+              </a:fontRef>
+            </p:style>
+          </p:cxnSp>
+          <p:cxnSp>
+            <p:nvCxnSpPr>
+              <p:cNvPr id="21" name="Straight Connector 20"/>
+              <p:cNvCxnSpPr/>
+              <p:nvPr/>
+            </p:nvCxnSpPr>
+            <p:spPr>
+              <a:xfrm rot="16200000">
+                <a:off x="2924598" y="3676748"/>
+                <a:ext cx="656802" cy="0"/>
+              </a:xfrm>
+              <a:prstGeom prst="line">
+                <a:avLst/>
+              </a:prstGeom>
+              <a:ln>
+                <a:solidFill>
+                  <a:schemeClr val="tx1"/>
+                </a:solidFill>
+                <a:prstDash val="lgDash"/>
+              </a:ln>
+            </p:spPr>
+            <p:style>
+              <a:lnRef idx="1">
+                <a:schemeClr val="accent1"/>
+              </a:lnRef>
+              <a:fillRef idx="0">
+                <a:schemeClr val="accent1"/>
+              </a:fillRef>
+              <a:effectRef idx="0">
+                <a:schemeClr val="accent1"/>
+              </a:effectRef>
+              <a:fontRef idx="minor">
+                <a:schemeClr val="tx1"/>
+              </a:fontRef>
+            </p:style>
+          </p:cxnSp>
+        </p:grpSp>
+        <p:pic>
+          <p:nvPicPr>
+            <p:cNvPr id="8" name="Picture 2"/>
+            <p:cNvPicPr>
+              <a:picLocks noChangeAspect="1" noChangeArrowheads="1"/>
+            </p:cNvPicPr>
+            <p:nvPr/>
+          </p:nvPicPr>
+          <p:blipFill rotWithShape="1">
+            <a:blip r:embed="rId2">
+              <a:extLst>
+                <a:ext uri="{28A0092B-C50C-407E-A947-70E740481C1C}">
+                  <a14:useLocalDpi xmlns:a14="http://schemas.microsoft.com/office/drawing/2010/main" val="0"/>
+                </a:ext>
+              </a:extLst>
+            </a:blip>
+            <a:srcRect l="18559" t="9910" r="16708"/>
+            <a:stretch/>
+          </p:blipFill>
+          <p:spPr bwMode="auto">
+            <a:xfrm>
+              <a:off x="4150775" y="1126232"/>
+              <a:ext cx="575688" cy="736315"/>
+            </a:xfrm>
+            <a:prstGeom prst="rect">
+              <a:avLst/>
+            </a:prstGeom>
+            <a:noFill/>
+            <a:ln>
+              <a:noFill/>
+            </a:ln>
+            <a:effectLst/>
+            <a:extLst>
+              <a:ext uri="{909E8E84-426E-40DD-AFC4-6F175D3DCCD1}">
+                <a14:hiddenFill xmlns:a14="http://schemas.microsoft.com/office/drawing/2010/main">
+                  <a:solidFill>
+                    <a:schemeClr val="accent1"/>
+                  </a:solidFill>
+                </a14:hiddenFill>
+              </a:ext>
+              <a:ext uri="{91240B29-F687-4F45-9708-019B960494DF}">
+                <a14:hiddenLine xmlns:a14="http://schemas.microsoft.com/office/drawing/2010/main" w="9525">
+                  <a:solidFill>
+                    <a:schemeClr val="tx1"/>
+                  </a:solidFill>
+                  <a:miter lim="800000"/>
+                  <a:headEnd/>
+                  <a:tailEnd/>
+                </a14:hiddenLine>
+              </a:ext>
+              <a:ext uri="{AF507438-7753-43E0-B8FC-AC1667EBCBE1}">
+                <a14:hiddenEffects xmlns:a14="http://schemas.microsoft.com/office/drawing/2010/main">
+                  <a:effectLst>
+                    <a:outerShdw dist="35921" dir="2700000" algn="ctr" rotWithShape="0">
+                      <a:schemeClr val="bg2"/>
+                    </a:outerShdw>
+                  </a:effectLst>
+                </a14:hiddenEffects>
+              </a:ext>
+            </a:extLst>
+          </p:spPr>
+        </p:pic>
+        <p:grpSp>
+          <p:nvGrpSpPr>
+            <p:cNvPr id="9" name="Group 8"/>
+            <p:cNvGrpSpPr/>
+            <p:nvPr/>
+          </p:nvGrpSpPr>
+          <p:grpSpPr>
+            <a:xfrm>
+              <a:off x="4110218" y="1165988"/>
+              <a:ext cx="656802" cy="656802"/>
+              <a:chOff x="2924598" y="3348347"/>
+              <a:chExt cx="656802" cy="656802"/>
+            </a:xfrm>
+          </p:grpSpPr>
+          <p:cxnSp>
+            <p:nvCxnSpPr>
+              <p:cNvPr id="18" name="Straight Connector 17"/>
+              <p:cNvCxnSpPr/>
+              <p:nvPr/>
+            </p:nvCxnSpPr>
+            <p:spPr>
+              <a:xfrm>
+                <a:off x="2924598" y="3676747"/>
+                <a:ext cx="656802" cy="0"/>
+              </a:xfrm>
+              <a:prstGeom prst="line">
+                <a:avLst/>
+              </a:prstGeom>
+              <a:ln>
+                <a:solidFill>
+                  <a:schemeClr val="tx1"/>
+                </a:solidFill>
+                <a:prstDash val="lgDash"/>
+              </a:ln>
+            </p:spPr>
+            <p:style>
+              <a:lnRef idx="1">
+                <a:schemeClr val="accent1"/>
+              </a:lnRef>
+              <a:fillRef idx="0">
+                <a:schemeClr val="accent1"/>
+              </a:fillRef>
+              <a:effectRef idx="0">
+                <a:schemeClr val="accent1"/>
+              </a:effectRef>
+              <a:fontRef idx="minor">
+                <a:schemeClr val="tx1"/>
+              </a:fontRef>
+            </p:style>
+          </p:cxnSp>
+          <p:cxnSp>
+            <p:nvCxnSpPr>
+              <p:cNvPr id="19" name="Straight Connector 18"/>
+              <p:cNvCxnSpPr/>
+              <p:nvPr/>
+            </p:nvCxnSpPr>
+            <p:spPr>
+              <a:xfrm rot="16200000">
+                <a:off x="2924598" y="3676748"/>
+                <a:ext cx="656802" cy="0"/>
+              </a:xfrm>
+              <a:prstGeom prst="line">
+                <a:avLst/>
+              </a:prstGeom>
+              <a:ln>
+                <a:solidFill>
+                  <a:schemeClr val="tx1"/>
+                </a:solidFill>
+                <a:prstDash val="lgDash"/>
+              </a:ln>
+            </p:spPr>
+            <p:style>
+              <a:lnRef idx="1">
+                <a:schemeClr val="accent1"/>
+              </a:lnRef>
+              <a:fillRef idx="0">
+                <a:schemeClr val="accent1"/>
+              </a:fillRef>
+              <a:effectRef idx="0">
+                <a:schemeClr val="accent1"/>
+              </a:effectRef>
+              <a:fontRef idx="minor">
+                <a:schemeClr val="tx1"/>
+              </a:fontRef>
+            </p:style>
+          </p:cxnSp>
+        </p:grpSp>
+        <p:sp>
+          <p:nvSpPr>
+            <p:cNvPr id="10" name="TextBox 9"/>
+            <p:cNvSpPr txBox="1"/>
+            <p:nvPr/>
+          </p:nvSpPr>
+          <p:spPr>
+            <a:xfrm>
+              <a:off x="2837418" y="1773694"/>
+              <a:ext cx="792205" cy="369332"/>
+            </a:xfrm>
+            <a:prstGeom prst="rect">
+              <a:avLst/>
+            </a:prstGeom>
+            <a:noFill/>
+          </p:spPr>
+          <p:txBody>
+            <a:bodyPr wrap="none" rtlCol="0">
+              <a:spAutoFit/>
+            </a:bodyPr>
+            <a:lstStyle/>
+            <a:p>
+              <a:r>
+                <a:rPr lang="en-CA" smtClean="0"/>
+                <a:t>[2,3,4]</a:t>
+              </a:r>
+              <a:endParaRPr lang="en-CA"/>
+            </a:p>
+          </p:txBody>
+        </p:sp>
+        <p:sp>
+          <p:nvSpPr>
+            <p:cNvPr id="11" name="TextBox 10"/>
+            <p:cNvSpPr txBox="1"/>
+            <p:nvPr/>
+          </p:nvSpPr>
+          <p:spPr>
+            <a:xfrm>
+              <a:off x="4110218" y="1769884"/>
+              <a:ext cx="909223" cy="369332"/>
+            </a:xfrm>
+            <a:prstGeom prst="rect">
+              <a:avLst/>
+            </a:prstGeom>
+            <a:noFill/>
+          </p:spPr>
+          <p:txBody>
+            <a:bodyPr wrap="none" rtlCol="0">
+              <a:spAutoFit/>
+            </a:bodyPr>
+            <a:lstStyle/>
+            <a:p>
+              <a:r>
+                <a:rPr lang="en-CA" smtClean="0"/>
+                <a:t>[10,3,4]</a:t>
+              </a:r>
+              <a:endParaRPr lang="en-CA"/>
+            </a:p>
+          </p:txBody>
+        </p:sp>
+        <p:cxnSp>
+          <p:nvCxnSpPr>
+            <p:cNvPr id="12" name="Straight Arrow Connector 11"/>
+            <p:cNvCxnSpPr>
+              <a:stCxn id="23" idx="0"/>
+            </p:cNvCxnSpPr>
+            <p:nvPr/>
+          </p:nvCxnSpPr>
+          <p:spPr>
+            <a:xfrm>
+              <a:off x="3186863" y="1503667"/>
+              <a:ext cx="1251756" cy="0"/>
+            </a:xfrm>
+            <a:prstGeom prst="straightConnector1">
+              <a:avLst/>
+            </a:prstGeom>
+            <a:ln w="38100">
+              <a:solidFill>
+                <a:srgbClr val="FF0000"/>
+              </a:solidFill>
+              <a:tailEnd type="arrow"/>
+            </a:ln>
+          </p:spPr>
+          <p:style>
+            <a:lnRef idx="1">
+              <a:schemeClr val="accent1"/>
+            </a:lnRef>
+            <a:fillRef idx="0">
+              <a:schemeClr val="accent1"/>
+            </a:fillRef>
+            <a:effectRef idx="0">
+              <a:schemeClr val="accent1"/>
+            </a:effectRef>
+            <a:fontRef idx="minor">
+              <a:schemeClr val="tx1"/>
+            </a:fontRef>
+          </p:style>
+        </p:cxnSp>
+        <p:sp>
+          <p:nvSpPr>
+            <p:cNvPr id="13" name="TextBox 12"/>
+            <p:cNvSpPr txBox="1"/>
+            <p:nvPr/>
+          </p:nvSpPr>
+          <p:spPr>
+            <a:xfrm>
+              <a:off x="2590800" y="834886"/>
+              <a:ext cx="288862" cy="369332"/>
+            </a:xfrm>
+            <a:prstGeom prst="rect">
+              <a:avLst/>
+            </a:prstGeom>
+            <a:noFill/>
+          </p:spPr>
+          <p:txBody>
+            <a:bodyPr wrap="none" rtlCol="0">
+              <a:spAutoFit/>
+            </a:bodyPr>
+            <a:lstStyle/>
+            <a:p>
+              <a:r>
+                <a:rPr lang="en-CA" smtClean="0"/>
+                <a:t>y</a:t>
+              </a:r>
+              <a:endParaRPr lang="en-CA"/>
+            </a:p>
+          </p:txBody>
+        </p:sp>
+        <p:sp>
+          <p:nvSpPr>
+            <p:cNvPr id="14" name="TextBox 13"/>
+            <p:cNvSpPr txBox="1"/>
+            <p:nvPr/>
+          </p:nvSpPr>
+          <p:spPr>
+            <a:xfrm>
+              <a:off x="5029200" y="1840468"/>
+              <a:ext cx="288862" cy="369332"/>
+            </a:xfrm>
+            <a:prstGeom prst="rect">
+              <a:avLst/>
+            </a:prstGeom>
+            <a:noFill/>
+          </p:spPr>
+          <p:txBody>
+            <a:bodyPr wrap="none" rtlCol="0">
+              <a:spAutoFit/>
+            </a:bodyPr>
+            <a:lstStyle/>
+            <a:p>
+              <a:r>
+                <a:rPr lang="en-CA" smtClean="0"/>
+                <a:t>x</a:t>
+              </a:r>
+              <a:endParaRPr lang="en-CA"/>
+            </a:p>
+          </p:txBody>
+        </p:sp>
+        <p:sp>
+          <p:nvSpPr>
+            <p:cNvPr id="15" name="TextBox 14"/>
+            <p:cNvSpPr txBox="1"/>
+            <p:nvPr/>
+          </p:nvSpPr>
+          <p:spPr>
+            <a:xfrm>
+              <a:off x="1990912" y="2640092"/>
+              <a:ext cx="276038" cy="369332"/>
+            </a:xfrm>
+            <a:prstGeom prst="rect">
+              <a:avLst/>
+            </a:prstGeom>
+            <a:noFill/>
+          </p:spPr>
+          <p:txBody>
+            <a:bodyPr wrap="none" rtlCol="0">
+              <a:spAutoFit/>
+            </a:bodyPr>
+            <a:lstStyle/>
+            <a:p>
+              <a:r>
+                <a:rPr lang="en-CA" smtClean="0"/>
+                <a:t>z</a:t>
+              </a:r>
+              <a:endParaRPr lang="en-CA"/>
+            </a:p>
+          </p:txBody>
+        </p:sp>
+        <p:sp>
+          <p:nvSpPr>
+            <p:cNvPr id="16" name="TextBox 15"/>
+            <p:cNvSpPr txBox="1"/>
+            <p:nvPr/>
+          </p:nvSpPr>
+          <p:spPr>
+            <a:xfrm>
+              <a:off x="2667000" y="2286000"/>
+              <a:ext cx="878767" cy="338554"/>
+            </a:xfrm>
+            <a:prstGeom prst="rect">
+              <a:avLst/>
+            </a:prstGeom>
+            <a:noFill/>
+          </p:spPr>
+          <p:txBody>
+            <a:bodyPr wrap="none" rtlCol="0">
+              <a:spAutoFit/>
+            </a:bodyPr>
+            <a:lstStyle/>
+            <a:p>
+              <a:r>
+                <a:rPr lang="en-CA" sz="1600" b="1" smtClean="0"/>
+                <a:t>position</a:t>
+              </a:r>
+              <a:endParaRPr lang="en-CA" sz="1600" b="1"/>
+            </a:p>
+          </p:txBody>
+        </p:sp>
+        <p:sp>
+          <p:nvSpPr>
+            <p:cNvPr id="17" name="TextBox 16"/>
+            <p:cNvSpPr txBox="1"/>
+            <p:nvPr/>
+          </p:nvSpPr>
+          <p:spPr>
+            <a:xfrm>
+              <a:off x="4091045" y="2287072"/>
+              <a:ext cx="1090555" cy="338554"/>
+            </a:xfrm>
+            <a:prstGeom prst="rect">
+              <a:avLst/>
+            </a:prstGeom>
+            <a:noFill/>
+          </p:spPr>
+          <p:txBody>
+            <a:bodyPr wrap="none" rtlCol="0">
+              <a:spAutoFit/>
+            </a:bodyPr>
+            <a:lstStyle/>
+            <a:p>
+              <a:r>
+                <a:rPr lang="en-CA" sz="1600" b="1" smtClean="0"/>
+                <a:t>focal point</a:t>
+              </a:r>
+              <a:endParaRPr lang="en-CA" sz="1600" b="1"/>
+            </a:p>
+          </p:txBody>
+        </p:sp>
+      </p:grpSp>
     </p:spTree>
     <p:extLst>
       <p:ext uri="{BB962C8B-B14F-4D97-AF65-F5344CB8AC3E}">
         <p14:creationId xmlns:p14="http://schemas.microsoft.com/office/powerpoint/2010/main" val="2526950475"/>
+      </p:ext>
+    </p:extLst>
+  </p:cSld>
+  <p:clrMapOvr>
+    <a:masterClrMapping/>
+  </p:clrMapOvr>
+</p:sld>
+</file>
+
+<file path=ppt/slides/slide3.xml><?xml version="1.0" encoding="utf-8"?>
+<p:sld xmlns:a="http://schemas.openxmlformats.org/drawingml/2006/main" xmlns:r="http://schemas.openxmlformats.org/officeDocument/2006/relationships" xmlns:p="http://schemas.openxmlformats.org/presentationml/2006/main">
+  <p:cSld>
+    <p:spTree>
+      <p:nvGrpSpPr>
+        <p:cNvPr id="1" name=""/>
+        <p:cNvGrpSpPr/>
+        <p:nvPr/>
+      </p:nvGrpSpPr>
+      <p:grpSpPr>
+        <a:xfrm>
+          <a:off x="0" y="0"/>
+          <a:ext cx="0" cy="0"/>
+          <a:chOff x="0" y="0"/>
+          <a:chExt cx="0" cy="0"/>
+        </a:xfrm>
+      </p:grpSpPr>
+      <p:grpSp>
+        <p:nvGrpSpPr>
+          <p:cNvPr id="98" name="Group 97"/>
+          <p:cNvGrpSpPr/>
+          <p:nvPr/>
+        </p:nvGrpSpPr>
+        <p:grpSpPr>
+          <a:xfrm>
+            <a:off x="528092" y="879634"/>
+            <a:ext cx="8019912" cy="4378166"/>
+            <a:chOff x="528092" y="879634"/>
+            <a:chExt cx="8019912" cy="4378166"/>
+          </a:xfrm>
+        </p:grpSpPr>
+        <p:grpSp>
+          <p:nvGrpSpPr>
+            <p:cNvPr id="97" name="Group 96"/>
+            <p:cNvGrpSpPr/>
+            <p:nvPr/>
+          </p:nvGrpSpPr>
+          <p:grpSpPr>
+            <a:xfrm>
+              <a:off x="1206398" y="1591193"/>
+              <a:ext cx="2454047" cy="2078373"/>
+              <a:chOff x="1135021" y="1591193"/>
+              <a:chExt cx="2454047" cy="2078373"/>
+            </a:xfrm>
+          </p:grpSpPr>
+          <p:grpSp>
+            <p:nvGrpSpPr>
+              <p:cNvPr id="6" name="Group 5"/>
+              <p:cNvGrpSpPr/>
+              <p:nvPr/>
+            </p:nvGrpSpPr>
+            <p:grpSpPr>
+              <a:xfrm>
+                <a:off x="1399884" y="2764241"/>
+                <a:ext cx="636270" cy="304800"/>
+                <a:chOff x="2133600" y="3505200"/>
+                <a:chExt cx="979170" cy="457200"/>
+              </a:xfrm>
+              <a:solidFill>
+                <a:schemeClr val="tx1">
+                  <a:lumMod val="25000"/>
+                  <a:lumOff val="75000"/>
+                </a:schemeClr>
+              </a:solidFill>
+            </p:grpSpPr>
+            <p:sp>
+              <p:nvSpPr>
+                <p:cNvPr id="22" name="Rectangle 21"/>
+                <p:cNvSpPr/>
+                <p:nvPr/>
+              </p:nvSpPr>
+              <p:spPr>
+                <a:xfrm>
+                  <a:off x="2133600" y="3505200"/>
+                  <a:ext cx="685800" cy="457200"/>
+                </a:xfrm>
+                <a:prstGeom prst="rect">
+                  <a:avLst/>
+                </a:prstGeom>
+                <a:grpFill/>
+                <a:ln>
+                  <a:noFill/>
+                </a:ln>
+              </p:spPr>
+              <p:style>
+                <a:lnRef idx="2">
+                  <a:schemeClr val="accent1">
+                    <a:shade val="50000"/>
+                  </a:schemeClr>
+                </a:lnRef>
+                <a:fillRef idx="1">
+                  <a:schemeClr val="accent1"/>
+                </a:fillRef>
+                <a:effectRef idx="0">
+                  <a:schemeClr val="accent1"/>
+                </a:effectRef>
+                <a:fontRef idx="minor">
+                  <a:schemeClr val="lt1"/>
+                </a:fontRef>
+              </p:style>
+              <p:txBody>
+                <a:bodyPr rtlCol="0" anchor="ctr"/>
+                <a:lstStyle/>
+                <a:p>
+                  <a:pPr algn="ctr"/>
+                  <a:endParaRPr lang="en-CA" b="1" u="sng"/>
+                </a:p>
+              </p:txBody>
+            </p:sp>
+            <p:sp>
+              <p:nvSpPr>
+                <p:cNvPr id="23" name="Isosceles Triangle 22"/>
+                <p:cNvSpPr/>
+                <p:nvPr/>
+              </p:nvSpPr>
+              <p:spPr>
+                <a:xfrm rot="16200000">
+                  <a:off x="2655570" y="3505200"/>
+                  <a:ext cx="457200" cy="457200"/>
+                </a:xfrm>
+                <a:prstGeom prst="triangle">
+                  <a:avLst/>
+                </a:prstGeom>
+                <a:grpFill/>
+                <a:ln>
+                  <a:noFill/>
+                </a:ln>
+              </p:spPr>
+              <p:style>
+                <a:lnRef idx="2">
+                  <a:schemeClr val="accent1">
+                    <a:shade val="50000"/>
+                  </a:schemeClr>
+                </a:lnRef>
+                <a:fillRef idx="1">
+                  <a:schemeClr val="accent1"/>
+                </a:fillRef>
+                <a:effectRef idx="0">
+                  <a:schemeClr val="accent1"/>
+                </a:effectRef>
+                <a:fontRef idx="minor">
+                  <a:schemeClr val="lt1"/>
+                </a:fontRef>
+              </p:style>
+              <p:txBody>
+                <a:bodyPr rtlCol="0" anchor="ctr"/>
+                <a:lstStyle/>
+                <a:p>
+                  <a:pPr algn="ctr"/>
+                  <a:endParaRPr lang="en-CA" b="1" u="sng"/>
+                </a:p>
+              </p:txBody>
+            </p:sp>
+          </p:grpSp>
+          <p:grpSp>
+            <p:nvGrpSpPr>
+              <p:cNvPr id="7" name="Group 6"/>
+              <p:cNvGrpSpPr/>
+              <p:nvPr/>
+            </p:nvGrpSpPr>
+            <p:grpSpPr>
+              <a:xfrm>
+                <a:off x="1389618" y="2588240"/>
+                <a:ext cx="656802" cy="656802"/>
+                <a:chOff x="2924598" y="3348347"/>
+                <a:chExt cx="656802" cy="656802"/>
+              </a:xfrm>
+            </p:grpSpPr>
+            <p:cxnSp>
+              <p:nvCxnSpPr>
+                <p:cNvPr id="20" name="Straight Connector 19"/>
+                <p:cNvCxnSpPr/>
+                <p:nvPr/>
+              </p:nvCxnSpPr>
+              <p:spPr>
+                <a:xfrm>
+                  <a:off x="2924598" y="3676747"/>
+                  <a:ext cx="656802" cy="0"/>
+                </a:xfrm>
+                <a:prstGeom prst="line">
+                  <a:avLst/>
+                </a:prstGeom>
+                <a:ln>
+                  <a:solidFill>
+                    <a:schemeClr val="tx1"/>
+                  </a:solidFill>
+                  <a:prstDash val="lgDash"/>
+                </a:ln>
+              </p:spPr>
+              <p:style>
+                <a:lnRef idx="1">
+                  <a:schemeClr val="accent1"/>
+                </a:lnRef>
+                <a:fillRef idx="0">
+                  <a:schemeClr val="accent1"/>
+                </a:fillRef>
+                <a:effectRef idx="0">
+                  <a:schemeClr val="accent1"/>
+                </a:effectRef>
+                <a:fontRef idx="minor">
+                  <a:schemeClr val="tx1"/>
+                </a:fontRef>
+              </p:style>
+            </p:cxnSp>
+            <p:cxnSp>
+              <p:nvCxnSpPr>
+                <p:cNvPr id="21" name="Straight Connector 20"/>
+                <p:cNvCxnSpPr/>
+                <p:nvPr/>
+              </p:nvCxnSpPr>
+              <p:spPr>
+                <a:xfrm rot="16200000">
+                  <a:off x="2924598" y="3676748"/>
+                  <a:ext cx="656802" cy="0"/>
+                </a:xfrm>
+                <a:prstGeom prst="line">
+                  <a:avLst/>
+                </a:prstGeom>
+                <a:ln>
+                  <a:solidFill>
+                    <a:schemeClr val="tx1"/>
+                  </a:solidFill>
+                  <a:prstDash val="lgDash"/>
+                </a:ln>
+              </p:spPr>
+              <p:style>
+                <a:lnRef idx="1">
+                  <a:schemeClr val="accent1"/>
+                </a:lnRef>
+                <a:fillRef idx="0">
+                  <a:schemeClr val="accent1"/>
+                </a:fillRef>
+                <a:effectRef idx="0">
+                  <a:schemeClr val="accent1"/>
+                </a:effectRef>
+                <a:fontRef idx="minor">
+                  <a:schemeClr val="tx1"/>
+                </a:fontRef>
+              </p:style>
+            </p:cxnSp>
+          </p:grpSp>
+          <p:pic>
+            <p:nvPicPr>
+              <p:cNvPr id="8" name="Picture 2"/>
+              <p:cNvPicPr>
+                <a:picLocks noChangeAspect="1" noChangeArrowheads="1"/>
+              </p:cNvPicPr>
+              <p:nvPr/>
+            </p:nvPicPr>
+            <p:blipFill rotWithShape="1">
+              <a:blip r:embed="rId2">
+                <a:extLst>
+                  <a:ext uri="{28A0092B-C50C-407E-A947-70E740481C1C}">
+                    <a14:useLocalDpi xmlns:a14="http://schemas.microsoft.com/office/drawing/2010/main" val="0"/>
+                  </a:ext>
+                </a:extLst>
+              </a:blip>
+              <a:srcRect l="18559" t="9910" r="16708"/>
+              <a:stretch/>
+            </p:blipFill>
+            <p:spPr bwMode="auto">
+              <a:xfrm>
+                <a:off x="2786346" y="2590800"/>
+                <a:ext cx="414054" cy="529582"/>
+              </a:xfrm>
+              <a:prstGeom prst="rect">
+                <a:avLst/>
+              </a:prstGeom>
+              <a:noFill/>
+              <a:ln>
+                <a:noFill/>
+              </a:ln>
+              <a:effectLst/>
+              <a:extLst>
+                <a:ext uri="{909E8E84-426E-40DD-AFC4-6F175D3DCCD1}">
+                  <a14:hiddenFill xmlns:a14="http://schemas.microsoft.com/office/drawing/2010/main">
+                    <a:solidFill>
+                      <a:schemeClr val="accent1"/>
+                    </a:solidFill>
+                  </a14:hiddenFill>
+                </a:ext>
+                <a:ext uri="{91240B29-F687-4F45-9708-019B960494DF}">
+                  <a14:hiddenLine xmlns:a14="http://schemas.microsoft.com/office/drawing/2010/main" w="9525">
+                    <a:solidFill>
+                      <a:schemeClr val="tx1"/>
+                    </a:solidFill>
+                    <a:miter lim="800000"/>
+                    <a:headEnd/>
+                    <a:tailEnd/>
+                  </a14:hiddenLine>
+                </a:ext>
+                <a:ext uri="{AF507438-7753-43E0-B8FC-AC1667EBCBE1}">
+                  <a14:hiddenEffects xmlns:a14="http://schemas.microsoft.com/office/drawing/2010/main">
+                    <a:effectLst>
+                      <a:outerShdw dist="35921" dir="2700000" algn="ctr" rotWithShape="0">
+                        <a:schemeClr val="bg2"/>
+                      </a:outerShdw>
+                    </a:effectLst>
+                  </a14:hiddenEffects>
+                </a:ext>
+              </a:extLst>
+            </p:spPr>
+          </p:pic>
+          <p:grpSp>
+            <p:nvGrpSpPr>
+              <p:cNvPr id="9" name="Group 8"/>
+              <p:cNvGrpSpPr/>
+              <p:nvPr/>
+            </p:nvGrpSpPr>
+            <p:grpSpPr>
+              <a:xfrm>
+                <a:off x="2662418" y="2578962"/>
+                <a:ext cx="656802" cy="656802"/>
+                <a:chOff x="2924598" y="3348347"/>
+                <a:chExt cx="656802" cy="656802"/>
+              </a:xfrm>
+            </p:grpSpPr>
+            <p:cxnSp>
+              <p:nvCxnSpPr>
+                <p:cNvPr id="18" name="Straight Connector 17"/>
+                <p:cNvCxnSpPr/>
+                <p:nvPr/>
+              </p:nvCxnSpPr>
+              <p:spPr>
+                <a:xfrm>
+                  <a:off x="2924598" y="3676747"/>
+                  <a:ext cx="656802" cy="0"/>
+                </a:xfrm>
+                <a:prstGeom prst="line">
+                  <a:avLst/>
+                </a:prstGeom>
+                <a:ln>
+                  <a:solidFill>
+                    <a:schemeClr val="tx1"/>
+                  </a:solidFill>
+                  <a:prstDash val="lgDash"/>
+                </a:ln>
+              </p:spPr>
+              <p:style>
+                <a:lnRef idx="1">
+                  <a:schemeClr val="accent1"/>
+                </a:lnRef>
+                <a:fillRef idx="0">
+                  <a:schemeClr val="accent1"/>
+                </a:fillRef>
+                <a:effectRef idx="0">
+                  <a:schemeClr val="accent1"/>
+                </a:effectRef>
+                <a:fontRef idx="minor">
+                  <a:schemeClr val="tx1"/>
+                </a:fontRef>
+              </p:style>
+            </p:cxnSp>
+            <p:cxnSp>
+              <p:nvCxnSpPr>
+                <p:cNvPr id="19" name="Straight Connector 18"/>
+                <p:cNvCxnSpPr/>
+                <p:nvPr/>
+              </p:nvCxnSpPr>
+              <p:spPr>
+                <a:xfrm rot="16200000">
+                  <a:off x="2924598" y="3676748"/>
+                  <a:ext cx="656802" cy="0"/>
+                </a:xfrm>
+                <a:prstGeom prst="line">
+                  <a:avLst/>
+                </a:prstGeom>
+                <a:ln>
+                  <a:solidFill>
+                    <a:schemeClr val="tx1"/>
+                  </a:solidFill>
+                  <a:prstDash val="lgDash"/>
+                </a:ln>
+              </p:spPr>
+              <p:style>
+                <a:lnRef idx="1">
+                  <a:schemeClr val="accent1"/>
+                </a:lnRef>
+                <a:fillRef idx="0">
+                  <a:schemeClr val="accent1"/>
+                </a:fillRef>
+                <a:effectRef idx="0">
+                  <a:schemeClr val="accent1"/>
+                </a:effectRef>
+                <a:fontRef idx="minor">
+                  <a:schemeClr val="tx1"/>
+                </a:fontRef>
+              </p:style>
+            </p:cxnSp>
+          </p:grpSp>
+          <p:cxnSp>
+            <p:nvCxnSpPr>
+              <p:cNvPr id="12" name="Straight Arrow Connector 11"/>
+              <p:cNvCxnSpPr>
+                <a:stCxn id="23" idx="0"/>
+              </p:cNvCxnSpPr>
+              <p:nvPr/>
+            </p:nvCxnSpPr>
+            <p:spPr>
+              <a:xfrm>
+                <a:off x="1739063" y="2916641"/>
+                <a:ext cx="1251756" cy="0"/>
+              </a:xfrm>
+              <a:prstGeom prst="straightConnector1">
+                <a:avLst/>
+              </a:prstGeom>
+              <a:ln w="38100">
+                <a:solidFill>
+                  <a:schemeClr val="bg1">
+                    <a:lumMod val="75000"/>
+                  </a:schemeClr>
+                </a:solidFill>
+                <a:tailEnd type="arrow"/>
+              </a:ln>
+            </p:spPr>
+            <p:style>
+              <a:lnRef idx="1">
+                <a:schemeClr val="accent1"/>
+              </a:lnRef>
+              <a:fillRef idx="0">
+                <a:schemeClr val="accent1"/>
+              </a:fillRef>
+              <a:effectRef idx="0">
+                <a:schemeClr val="accent1"/>
+              </a:effectRef>
+              <a:fontRef idx="minor">
+                <a:schemeClr val="tx1"/>
+              </a:fontRef>
+            </p:style>
+          </p:cxnSp>
+          <p:sp>
+            <p:nvSpPr>
+              <p:cNvPr id="16" name="TextBox 15"/>
+              <p:cNvSpPr txBox="1"/>
+              <p:nvPr/>
+            </p:nvSpPr>
+            <p:spPr>
+              <a:xfrm>
+                <a:off x="1135021" y="3331012"/>
+                <a:ext cx="878767" cy="338554"/>
+              </a:xfrm>
+              <a:prstGeom prst="rect">
+                <a:avLst/>
+              </a:prstGeom>
+              <a:noFill/>
+            </p:spPr>
+            <p:txBody>
+              <a:bodyPr wrap="none" rtlCol="0">
+                <a:spAutoFit/>
+              </a:bodyPr>
+              <a:lstStyle/>
+              <a:p>
+                <a:r>
+                  <a:rPr lang="en-CA" sz="1600" b="1" u="sng" smtClean="0"/>
+                  <a:t>position</a:t>
+                </a:r>
+                <a:endParaRPr lang="en-CA" sz="1600" b="1" u="sng"/>
+              </a:p>
+            </p:txBody>
+          </p:sp>
+          <p:sp>
+            <p:nvSpPr>
+              <p:cNvPr id="17" name="TextBox 16"/>
+              <p:cNvSpPr txBox="1"/>
+              <p:nvPr/>
+            </p:nvSpPr>
+            <p:spPr>
+              <a:xfrm>
+                <a:off x="2498513" y="3331012"/>
+                <a:ext cx="1090555" cy="338554"/>
+              </a:xfrm>
+              <a:prstGeom prst="rect">
+                <a:avLst/>
+              </a:prstGeom>
+              <a:noFill/>
+            </p:spPr>
+            <p:txBody>
+              <a:bodyPr wrap="none" rtlCol="0">
+                <a:spAutoFit/>
+              </a:bodyPr>
+              <a:lstStyle/>
+              <a:p>
+                <a:r>
+                  <a:rPr lang="en-CA" sz="1600" b="1" u="sng" smtClean="0"/>
+                  <a:t>focal point</a:t>
+                </a:r>
+                <a:endParaRPr lang="en-CA" sz="1600" b="1" u="sng"/>
+              </a:p>
+            </p:txBody>
+          </p:sp>
+          <p:grpSp>
+            <p:nvGrpSpPr>
+              <p:cNvPr id="52" name="Group 51"/>
+              <p:cNvGrpSpPr/>
+              <p:nvPr/>
+            </p:nvGrpSpPr>
+            <p:grpSpPr>
+              <a:xfrm rot="2985900">
+                <a:off x="1870419" y="1767193"/>
+                <a:ext cx="636270" cy="304800"/>
+                <a:chOff x="2133600" y="3505200"/>
+                <a:chExt cx="979170" cy="457200"/>
+              </a:xfrm>
+              <a:solidFill>
+                <a:schemeClr val="accent1"/>
+              </a:solidFill>
+            </p:grpSpPr>
+            <p:sp>
+              <p:nvSpPr>
+                <p:cNvPr id="53" name="Rectangle 52"/>
+                <p:cNvSpPr/>
+                <p:nvPr/>
+              </p:nvSpPr>
+              <p:spPr>
+                <a:xfrm>
+                  <a:off x="2133600" y="3505200"/>
+                  <a:ext cx="685800" cy="457200"/>
+                </a:xfrm>
+                <a:prstGeom prst="rect">
+                  <a:avLst/>
+                </a:prstGeom>
+                <a:solidFill>
+                  <a:schemeClr val="bg1">
+                    <a:lumMod val="50000"/>
+                  </a:schemeClr>
+                </a:solidFill>
+                <a:ln>
+                  <a:noFill/>
+                </a:ln>
+              </p:spPr>
+              <p:style>
+                <a:lnRef idx="2">
+                  <a:schemeClr val="accent1">
+                    <a:shade val="50000"/>
+                  </a:schemeClr>
+                </a:lnRef>
+                <a:fillRef idx="1">
+                  <a:schemeClr val="accent1"/>
+                </a:fillRef>
+                <a:effectRef idx="0">
+                  <a:schemeClr val="accent1"/>
+                </a:effectRef>
+                <a:fontRef idx="minor">
+                  <a:schemeClr val="lt1"/>
+                </a:fontRef>
+              </p:style>
+              <p:txBody>
+                <a:bodyPr rtlCol="0" anchor="ctr"/>
+                <a:lstStyle/>
+                <a:p>
+                  <a:pPr algn="ctr"/>
+                  <a:endParaRPr lang="en-CA" b="1" u="sng"/>
+                </a:p>
+              </p:txBody>
+            </p:sp>
+            <p:sp>
+              <p:nvSpPr>
+                <p:cNvPr id="54" name="Isosceles Triangle 53"/>
+                <p:cNvSpPr/>
+                <p:nvPr/>
+              </p:nvSpPr>
+              <p:spPr>
+                <a:xfrm rot="16200000">
+                  <a:off x="2655570" y="3505200"/>
+                  <a:ext cx="457200" cy="457200"/>
+                </a:xfrm>
+                <a:prstGeom prst="triangle">
+                  <a:avLst/>
+                </a:prstGeom>
+                <a:solidFill>
+                  <a:schemeClr val="bg1">
+                    <a:lumMod val="50000"/>
+                  </a:schemeClr>
+                </a:solidFill>
+                <a:ln>
+                  <a:noFill/>
+                </a:ln>
+              </p:spPr>
+              <p:style>
+                <a:lnRef idx="2">
+                  <a:schemeClr val="accent1">
+                    <a:shade val="50000"/>
+                  </a:schemeClr>
+                </a:lnRef>
+                <a:fillRef idx="1">
+                  <a:schemeClr val="accent1"/>
+                </a:fillRef>
+                <a:effectRef idx="0">
+                  <a:schemeClr val="accent1"/>
+                </a:effectRef>
+                <a:fontRef idx="minor">
+                  <a:schemeClr val="lt1"/>
+                </a:fontRef>
+              </p:style>
+              <p:txBody>
+                <a:bodyPr rtlCol="0" anchor="ctr"/>
+                <a:lstStyle/>
+                <a:p>
+                  <a:pPr algn="ctr"/>
+                  <a:endParaRPr lang="en-CA" b="1" u="sng"/>
+                </a:p>
+              </p:txBody>
+            </p:sp>
+          </p:grpSp>
+          <p:cxnSp>
+            <p:nvCxnSpPr>
+              <p:cNvPr id="49" name="Straight Arrow Connector 48"/>
+              <p:cNvCxnSpPr/>
+              <p:nvPr/>
+            </p:nvCxnSpPr>
+            <p:spPr>
+              <a:xfrm>
+                <a:off x="2181823" y="1919593"/>
+                <a:ext cx="808996" cy="987770"/>
+              </a:xfrm>
+              <a:prstGeom prst="straightConnector1">
+                <a:avLst/>
+              </a:prstGeom>
+              <a:ln w="38100">
+                <a:solidFill>
+                  <a:schemeClr val="accent6"/>
+                </a:solidFill>
+                <a:tailEnd type="arrow"/>
+              </a:ln>
+            </p:spPr>
+            <p:style>
+              <a:lnRef idx="1">
+                <a:schemeClr val="accent1"/>
+              </a:lnRef>
+              <a:fillRef idx="0">
+                <a:schemeClr val="accent1"/>
+              </a:fillRef>
+              <a:effectRef idx="0">
+                <a:schemeClr val="accent1"/>
+              </a:effectRef>
+              <a:fontRef idx="minor">
+                <a:schemeClr val="tx1"/>
+              </a:fontRef>
+            </p:style>
+          </p:cxnSp>
+          <p:grpSp>
+            <p:nvGrpSpPr>
+              <p:cNvPr id="46" name="Group 45"/>
+              <p:cNvGrpSpPr/>
+              <p:nvPr/>
+            </p:nvGrpSpPr>
+            <p:grpSpPr>
+              <a:xfrm>
+                <a:off x="1845521" y="1591193"/>
+                <a:ext cx="656802" cy="656802"/>
+                <a:chOff x="2924598" y="3348347"/>
+                <a:chExt cx="656802" cy="656802"/>
+              </a:xfrm>
+            </p:grpSpPr>
+            <p:cxnSp>
+              <p:nvCxnSpPr>
+                <p:cNvPr id="47" name="Straight Connector 46"/>
+                <p:cNvCxnSpPr/>
+                <p:nvPr/>
+              </p:nvCxnSpPr>
+              <p:spPr>
+                <a:xfrm>
+                  <a:off x="2924598" y="3676747"/>
+                  <a:ext cx="656802" cy="0"/>
+                </a:xfrm>
+                <a:prstGeom prst="line">
+                  <a:avLst/>
+                </a:prstGeom>
+                <a:ln>
+                  <a:solidFill>
+                    <a:schemeClr val="tx1"/>
+                  </a:solidFill>
+                  <a:prstDash val="lgDash"/>
+                </a:ln>
+              </p:spPr>
+              <p:style>
+                <a:lnRef idx="1">
+                  <a:schemeClr val="accent1"/>
+                </a:lnRef>
+                <a:fillRef idx="0">
+                  <a:schemeClr val="accent1"/>
+                </a:fillRef>
+                <a:effectRef idx="0">
+                  <a:schemeClr val="accent1"/>
+                </a:effectRef>
+                <a:fontRef idx="minor">
+                  <a:schemeClr val="tx1"/>
+                </a:fontRef>
+              </p:style>
+            </p:cxnSp>
+            <p:cxnSp>
+              <p:nvCxnSpPr>
+                <p:cNvPr id="48" name="Straight Connector 47"/>
+                <p:cNvCxnSpPr/>
+                <p:nvPr/>
+              </p:nvCxnSpPr>
+              <p:spPr>
+                <a:xfrm rot="16200000">
+                  <a:off x="2924598" y="3676748"/>
+                  <a:ext cx="656802" cy="0"/>
+                </a:xfrm>
+                <a:prstGeom prst="line">
+                  <a:avLst/>
+                </a:prstGeom>
+                <a:ln>
+                  <a:solidFill>
+                    <a:schemeClr val="tx1"/>
+                  </a:solidFill>
+                  <a:prstDash val="lgDash"/>
+                </a:ln>
+              </p:spPr>
+              <p:style>
+                <a:lnRef idx="1">
+                  <a:schemeClr val="accent1"/>
+                </a:lnRef>
+                <a:fillRef idx="0">
+                  <a:schemeClr val="accent1"/>
+                </a:fillRef>
+                <a:effectRef idx="0">
+                  <a:schemeClr val="accent1"/>
+                </a:effectRef>
+                <a:fontRef idx="minor">
+                  <a:schemeClr val="tx1"/>
+                </a:fontRef>
+              </p:style>
+            </p:cxnSp>
+          </p:grpSp>
+          <p:sp>
+            <p:nvSpPr>
+              <p:cNvPr id="56" name="Circular Arrow 55"/>
+              <p:cNvSpPr/>
+              <p:nvPr/>
+            </p:nvSpPr>
+            <p:spPr>
+              <a:xfrm rot="15895572">
+                <a:off x="1613216" y="1998070"/>
+                <a:ext cx="969501" cy="1115804"/>
+              </a:xfrm>
+              <a:prstGeom prst="circularArrow">
+                <a:avLst>
+                  <a:gd name="adj1" fmla="val 13795"/>
+                  <a:gd name="adj2" fmla="val 1752037"/>
+                  <a:gd name="adj3" fmla="val 19072468"/>
+                  <a:gd name="adj4" fmla="val 16783505"/>
+                  <a:gd name="adj5" fmla="val 18734"/>
+                </a:avLst>
+              </a:prstGeom>
+            </p:spPr>
+            <p:style>
+              <a:lnRef idx="2">
+                <a:schemeClr val="accent6">
+                  <a:shade val="50000"/>
+                </a:schemeClr>
+              </a:lnRef>
+              <a:fillRef idx="1">
+                <a:schemeClr val="accent6"/>
+              </a:fillRef>
+              <a:effectRef idx="0">
+                <a:schemeClr val="accent6"/>
+              </a:effectRef>
+              <a:fontRef idx="minor">
+                <a:schemeClr val="lt1"/>
+              </a:fontRef>
+            </p:style>
+            <p:txBody>
+              <a:bodyPr rtlCol="0" anchor="ctr"/>
+              <a:lstStyle/>
+              <a:p>
+                <a:pPr algn="ctr"/>
+                <a:endParaRPr lang="en-CA" b="1">
+                  <a:solidFill>
+                    <a:schemeClr val="tx1"/>
+                  </a:solidFill>
+                </a:endParaRPr>
+              </a:p>
+            </p:txBody>
+          </p:sp>
+        </p:grpSp>
+        <p:sp>
+          <p:nvSpPr>
+            <p:cNvPr id="82" name="TextBox 81"/>
+            <p:cNvSpPr txBox="1"/>
+            <p:nvPr/>
+          </p:nvSpPr>
+          <p:spPr>
+            <a:xfrm>
+              <a:off x="543421" y="879634"/>
+              <a:ext cx="3780001" cy="584775"/>
+            </a:xfrm>
+            <a:prstGeom prst="rect">
+              <a:avLst/>
+            </a:prstGeom>
+            <a:noFill/>
+          </p:spPr>
+          <p:txBody>
+            <a:bodyPr wrap="square" rtlCol="0">
+              <a:spAutoFit/>
+            </a:bodyPr>
+            <a:lstStyle/>
+            <a:p>
+              <a:pPr algn="ctr"/>
+              <a:r>
+                <a:rPr lang="en-CA" sz="1600" b="1" smtClean="0"/>
+                <a:t>Orbiting</a:t>
+              </a:r>
+              <a:r>
+                <a:rPr lang="en-CA" sz="1600" smtClean="0"/>
+                <a:t> </a:t>
+              </a:r>
+              <a:br>
+                <a:rPr lang="en-CA" sz="1600" smtClean="0"/>
+              </a:br>
+              <a:r>
+                <a:rPr lang="en-CA" sz="1600" smtClean="0"/>
+                <a:t>rotation around the focal point</a:t>
+              </a:r>
+              <a:endParaRPr lang="en-CA" sz="1600"/>
+            </a:p>
+          </p:txBody>
+        </p:sp>
+        <p:sp>
+          <p:nvSpPr>
+            <p:cNvPr id="83" name="TextBox 82"/>
+            <p:cNvSpPr txBox="1"/>
+            <p:nvPr/>
+          </p:nvSpPr>
+          <p:spPr>
+            <a:xfrm>
+              <a:off x="5015181" y="906066"/>
+              <a:ext cx="3254994" cy="584775"/>
+            </a:xfrm>
+            <a:prstGeom prst="rect">
+              <a:avLst/>
+            </a:prstGeom>
+            <a:noFill/>
+          </p:spPr>
+          <p:txBody>
+            <a:bodyPr wrap="none" rtlCol="0">
+              <a:spAutoFit/>
+            </a:bodyPr>
+            <a:lstStyle/>
+            <a:p>
+              <a:pPr algn="ctr"/>
+              <a:r>
+                <a:rPr lang="en-CA" sz="1600" b="1" smtClean="0"/>
+                <a:t>Tracking</a:t>
+              </a:r>
+              <a:r>
+                <a:rPr lang="en-CA" sz="1600" smtClean="0"/>
+                <a:t/>
+              </a:r>
+              <a:br>
+                <a:rPr lang="en-CA" sz="1600" smtClean="0"/>
+              </a:br>
+              <a:r>
+                <a:rPr lang="en-CA" sz="1600" smtClean="0"/>
+                <a:t> rotation around the camera position</a:t>
+              </a:r>
+              <a:endParaRPr lang="en-CA" sz="1600"/>
+            </a:p>
+          </p:txBody>
+        </p:sp>
+        <p:sp>
+          <p:nvSpPr>
+            <p:cNvPr id="84" name="TextBox 83"/>
+            <p:cNvSpPr txBox="1"/>
+            <p:nvPr/>
+          </p:nvSpPr>
+          <p:spPr>
+            <a:xfrm>
+              <a:off x="528092" y="4283333"/>
+              <a:ext cx="3810659" cy="646331"/>
+            </a:xfrm>
+            <a:prstGeom prst="rect">
+              <a:avLst/>
+            </a:prstGeom>
+            <a:noFill/>
+          </p:spPr>
+          <p:txBody>
+            <a:bodyPr wrap="none" rtlCol="0">
+              <a:spAutoFit/>
+            </a:bodyPr>
+            <a:lstStyle/>
+            <a:p>
+              <a:r>
+                <a:rPr lang="en-CA" sz="1200">
+                  <a:latin typeface="Courier New" pitchFamily="49" charset="0"/>
+                  <a:cs typeface="Courier New" pitchFamily="49" charset="0"/>
+                </a:rPr>
+                <a:t>v</a:t>
+              </a:r>
+              <a:r>
+                <a:rPr lang="en-CA" sz="1200" smtClean="0">
+                  <a:latin typeface="Courier New" pitchFamily="49" charset="0"/>
+                  <a:cs typeface="Courier New" pitchFamily="49" charset="0"/>
+                </a:rPr>
+                <a:t>ar c = vxl.c.camera;</a:t>
+              </a:r>
+            </a:p>
+            <a:p>
+              <a:r>
+                <a:rPr lang="en-CA" sz="1200" smtClean="0">
+                  <a:latin typeface="Courier New" pitchFamily="49" charset="0"/>
+                  <a:cs typeface="Courier New" pitchFamily="49" charset="0"/>
+                </a:rPr>
+                <a:t>c.setType(vxl.def.camera.type.</a:t>
+              </a:r>
+              <a:r>
+                <a:rPr lang="en-CA" sz="1200" i="1" smtClean="0">
+                  <a:latin typeface="Courier New" pitchFamily="49" charset="0"/>
+                  <a:cs typeface="Courier New" pitchFamily="49" charset="0"/>
+                </a:rPr>
+                <a:t>ORBITING</a:t>
+              </a:r>
+              <a:r>
+                <a:rPr lang="en-CA" sz="1200" smtClean="0">
+                  <a:latin typeface="Courier New" pitchFamily="49" charset="0"/>
+                  <a:cs typeface="Courier New" pitchFamily="49" charset="0"/>
+                </a:rPr>
+                <a:t>)</a:t>
+              </a:r>
+            </a:p>
+            <a:p>
+              <a:r>
+                <a:rPr lang="en-CA" sz="1200" smtClean="0">
+                  <a:latin typeface="Courier New" pitchFamily="49" charset="0"/>
+                  <a:cs typeface="Courier New" pitchFamily="49" charset="0"/>
+                </a:rPr>
+                <a:t>c.setElevation(30)</a:t>
+              </a:r>
+              <a:endParaRPr lang="en-CA" sz="1200">
+                <a:latin typeface="Courier New" pitchFamily="49" charset="0"/>
+                <a:cs typeface="Courier New" pitchFamily="49" charset="0"/>
+              </a:endParaRPr>
+            </a:p>
+          </p:txBody>
+        </p:sp>
+        <p:sp>
+          <p:nvSpPr>
+            <p:cNvPr id="85" name="TextBox 84"/>
+            <p:cNvSpPr txBox="1"/>
+            <p:nvPr/>
+          </p:nvSpPr>
+          <p:spPr>
+            <a:xfrm>
+              <a:off x="4737345" y="4320510"/>
+              <a:ext cx="3810659" cy="646331"/>
+            </a:xfrm>
+            <a:prstGeom prst="rect">
+              <a:avLst/>
+            </a:prstGeom>
+            <a:noFill/>
+          </p:spPr>
+          <p:txBody>
+            <a:bodyPr wrap="none" rtlCol="0">
+              <a:spAutoFit/>
+            </a:bodyPr>
+            <a:lstStyle/>
+            <a:p>
+              <a:r>
+                <a:rPr lang="en-CA" sz="1200">
+                  <a:latin typeface="Courier New" pitchFamily="49" charset="0"/>
+                  <a:cs typeface="Courier New" pitchFamily="49" charset="0"/>
+                </a:rPr>
+                <a:t>v</a:t>
+              </a:r>
+              <a:r>
+                <a:rPr lang="en-CA" sz="1200" smtClean="0">
+                  <a:latin typeface="Courier New" pitchFamily="49" charset="0"/>
+                  <a:cs typeface="Courier New" pitchFamily="49" charset="0"/>
+                </a:rPr>
+                <a:t>ar c = vxl.c.camera;</a:t>
+              </a:r>
+            </a:p>
+            <a:p>
+              <a:r>
+                <a:rPr lang="en-CA" sz="1200" smtClean="0">
+                  <a:latin typeface="Courier New" pitchFamily="49" charset="0"/>
+                  <a:cs typeface="Courier New" pitchFamily="49" charset="0"/>
+                </a:rPr>
+                <a:t>c.setType(vxl.def.camera.type.</a:t>
+              </a:r>
+              <a:r>
+                <a:rPr lang="en-CA" sz="1200" i="1" smtClean="0">
+                  <a:latin typeface="Courier New" pitchFamily="49" charset="0"/>
+                  <a:cs typeface="Courier New" pitchFamily="49" charset="0"/>
+                </a:rPr>
+                <a:t>TRACKING</a:t>
+              </a:r>
+              <a:r>
+                <a:rPr lang="en-CA" sz="1200" smtClean="0">
+                  <a:latin typeface="Courier New" pitchFamily="49" charset="0"/>
+                  <a:cs typeface="Courier New" pitchFamily="49" charset="0"/>
+                </a:rPr>
+                <a:t>)</a:t>
+              </a:r>
+            </a:p>
+            <a:p>
+              <a:r>
+                <a:rPr lang="en-CA" sz="1200" smtClean="0">
+                  <a:latin typeface="Courier New" pitchFamily="49" charset="0"/>
+                  <a:cs typeface="Courier New" pitchFamily="49" charset="0"/>
+                </a:rPr>
+                <a:t>c.setElevation(30)</a:t>
+              </a:r>
+              <a:endParaRPr lang="en-CA" sz="1200">
+                <a:latin typeface="Courier New" pitchFamily="49" charset="0"/>
+                <a:cs typeface="Courier New" pitchFamily="49" charset="0"/>
+              </a:endParaRPr>
+            </a:p>
+          </p:txBody>
+        </p:sp>
+        <p:grpSp>
+          <p:nvGrpSpPr>
+            <p:cNvPr id="96" name="Group 95"/>
+            <p:cNvGrpSpPr/>
+            <p:nvPr/>
+          </p:nvGrpSpPr>
+          <p:grpSpPr>
+            <a:xfrm>
+              <a:off x="5415651" y="1485827"/>
+              <a:ext cx="2454047" cy="2160749"/>
+              <a:chOff x="4873403" y="1485827"/>
+              <a:chExt cx="2454047" cy="2160749"/>
+            </a:xfrm>
+          </p:grpSpPr>
+          <p:grpSp>
+            <p:nvGrpSpPr>
+              <p:cNvPr id="86" name="Group 85"/>
+              <p:cNvGrpSpPr/>
+              <p:nvPr/>
+            </p:nvGrpSpPr>
+            <p:grpSpPr>
+              <a:xfrm>
+                <a:off x="5186600" y="2741251"/>
+                <a:ext cx="636270" cy="304800"/>
+                <a:chOff x="2133600" y="3505200"/>
+                <a:chExt cx="979170" cy="457200"/>
+              </a:xfrm>
+              <a:solidFill>
+                <a:schemeClr val="tx1">
+                  <a:lumMod val="25000"/>
+                  <a:lumOff val="75000"/>
+                </a:schemeClr>
+              </a:solidFill>
+            </p:grpSpPr>
+            <p:sp>
+              <p:nvSpPr>
+                <p:cNvPr id="87" name="Rectangle 86"/>
+                <p:cNvSpPr/>
+                <p:nvPr/>
+              </p:nvSpPr>
+              <p:spPr>
+                <a:xfrm>
+                  <a:off x="2133600" y="3505200"/>
+                  <a:ext cx="685800" cy="457200"/>
+                </a:xfrm>
+                <a:prstGeom prst="rect">
+                  <a:avLst/>
+                </a:prstGeom>
+                <a:grpFill/>
+                <a:ln>
+                  <a:noFill/>
+                </a:ln>
+              </p:spPr>
+              <p:style>
+                <a:lnRef idx="2">
+                  <a:schemeClr val="accent1">
+                    <a:shade val="50000"/>
+                  </a:schemeClr>
+                </a:lnRef>
+                <a:fillRef idx="1">
+                  <a:schemeClr val="accent1"/>
+                </a:fillRef>
+                <a:effectRef idx="0">
+                  <a:schemeClr val="accent1"/>
+                </a:effectRef>
+                <a:fontRef idx="minor">
+                  <a:schemeClr val="lt1"/>
+                </a:fontRef>
+              </p:style>
+              <p:txBody>
+                <a:bodyPr rtlCol="0" anchor="ctr"/>
+                <a:lstStyle/>
+                <a:p>
+                  <a:pPr algn="ctr"/>
+                  <a:endParaRPr lang="en-CA" b="1" u="sng"/>
+                </a:p>
+              </p:txBody>
+            </p:sp>
+            <p:sp>
+              <p:nvSpPr>
+                <p:cNvPr id="88" name="Isosceles Triangle 87"/>
+                <p:cNvSpPr/>
+                <p:nvPr/>
+              </p:nvSpPr>
+              <p:spPr>
+                <a:xfrm rot="16200000">
+                  <a:off x="2655570" y="3505200"/>
+                  <a:ext cx="457200" cy="457200"/>
+                </a:xfrm>
+                <a:prstGeom prst="triangle">
+                  <a:avLst/>
+                </a:prstGeom>
+                <a:grpFill/>
+                <a:ln>
+                  <a:noFill/>
+                </a:ln>
+              </p:spPr>
+              <p:style>
+                <a:lnRef idx="2">
+                  <a:schemeClr val="accent1">
+                    <a:shade val="50000"/>
+                  </a:schemeClr>
+                </a:lnRef>
+                <a:fillRef idx="1">
+                  <a:schemeClr val="accent1"/>
+                </a:fillRef>
+                <a:effectRef idx="0">
+                  <a:schemeClr val="accent1"/>
+                </a:effectRef>
+                <a:fontRef idx="minor">
+                  <a:schemeClr val="lt1"/>
+                </a:fontRef>
+              </p:style>
+              <p:txBody>
+                <a:bodyPr rtlCol="0" anchor="ctr"/>
+                <a:lstStyle/>
+                <a:p>
+                  <a:pPr algn="ctr"/>
+                  <a:endParaRPr lang="en-CA" b="1" u="sng"/>
+                </a:p>
+              </p:txBody>
+            </p:sp>
+          </p:grpSp>
+          <p:pic>
+            <p:nvPicPr>
+              <p:cNvPr id="63" name="Picture 2"/>
+              <p:cNvPicPr>
+                <a:picLocks noChangeAspect="1" noChangeArrowheads="1"/>
+              </p:cNvPicPr>
+              <p:nvPr/>
+            </p:nvPicPr>
+            <p:blipFill rotWithShape="1">
+              <a:blip r:embed="rId2">
+                <a:extLst>
+                  <a:ext uri="{28A0092B-C50C-407E-A947-70E740481C1C}">
+                    <a14:useLocalDpi xmlns:a14="http://schemas.microsoft.com/office/drawing/2010/main" val="0"/>
+                  </a:ext>
+                </a:extLst>
+              </a:blip>
+              <a:srcRect l="18559" t="9910" r="16708"/>
+              <a:stretch/>
+            </p:blipFill>
+            <p:spPr bwMode="auto">
+              <a:xfrm>
+                <a:off x="6524728" y="2567810"/>
+                <a:ext cx="414054" cy="529582"/>
+              </a:xfrm>
+              <a:prstGeom prst="rect">
+                <a:avLst/>
+              </a:prstGeom>
+              <a:noFill/>
+              <a:ln>
+                <a:noFill/>
+              </a:ln>
+              <a:effectLst/>
+              <a:extLst>
+                <a:ext uri="{909E8E84-426E-40DD-AFC4-6F175D3DCCD1}">
+                  <a14:hiddenFill xmlns:a14="http://schemas.microsoft.com/office/drawing/2010/main">
+                    <a:solidFill>
+                      <a:schemeClr val="accent1"/>
+                    </a:solidFill>
+                  </a14:hiddenFill>
+                </a:ext>
+                <a:ext uri="{91240B29-F687-4F45-9708-019B960494DF}">
+                  <a14:hiddenLine xmlns:a14="http://schemas.microsoft.com/office/drawing/2010/main" w="9525">
+                    <a:solidFill>
+                      <a:schemeClr val="tx1"/>
+                    </a:solidFill>
+                    <a:miter lim="800000"/>
+                    <a:headEnd/>
+                    <a:tailEnd/>
+                  </a14:hiddenLine>
+                </a:ext>
+                <a:ext uri="{AF507438-7753-43E0-B8FC-AC1667EBCBE1}">
+                  <a14:hiddenEffects xmlns:a14="http://schemas.microsoft.com/office/drawing/2010/main">
+                    <a:effectLst>
+                      <a:outerShdw dist="35921" dir="2700000" algn="ctr" rotWithShape="0">
+                        <a:schemeClr val="bg2"/>
+                      </a:outerShdw>
+                    </a:effectLst>
+                  </a14:hiddenEffects>
+                </a:ext>
+              </a:extLst>
+            </p:spPr>
+          </p:pic>
+          <p:grpSp>
+            <p:nvGrpSpPr>
+              <p:cNvPr id="64" name="Group 63"/>
+              <p:cNvGrpSpPr/>
+              <p:nvPr/>
+            </p:nvGrpSpPr>
+            <p:grpSpPr>
+              <a:xfrm>
+                <a:off x="6400800" y="2555972"/>
+                <a:ext cx="656802" cy="656802"/>
+                <a:chOff x="2924598" y="3348347"/>
+                <a:chExt cx="656802" cy="656802"/>
+              </a:xfrm>
+            </p:grpSpPr>
+            <p:cxnSp>
+              <p:nvCxnSpPr>
+                <p:cNvPr id="65" name="Straight Connector 64"/>
+                <p:cNvCxnSpPr/>
+                <p:nvPr/>
+              </p:nvCxnSpPr>
+              <p:spPr>
+                <a:xfrm>
+                  <a:off x="2924598" y="3676747"/>
+                  <a:ext cx="656802" cy="0"/>
+                </a:xfrm>
+                <a:prstGeom prst="line">
+                  <a:avLst/>
+                </a:prstGeom>
+                <a:ln>
+                  <a:solidFill>
+                    <a:schemeClr val="tx1"/>
+                  </a:solidFill>
+                  <a:prstDash val="lgDash"/>
+                </a:ln>
+              </p:spPr>
+              <p:style>
+                <a:lnRef idx="1">
+                  <a:schemeClr val="accent1"/>
+                </a:lnRef>
+                <a:fillRef idx="0">
+                  <a:schemeClr val="accent1"/>
+                </a:fillRef>
+                <a:effectRef idx="0">
+                  <a:schemeClr val="accent1"/>
+                </a:effectRef>
+                <a:fontRef idx="minor">
+                  <a:schemeClr val="tx1"/>
+                </a:fontRef>
+              </p:style>
+            </p:cxnSp>
+            <p:cxnSp>
+              <p:nvCxnSpPr>
+                <p:cNvPr id="66" name="Straight Connector 65"/>
+                <p:cNvCxnSpPr/>
+                <p:nvPr/>
+              </p:nvCxnSpPr>
+              <p:spPr>
+                <a:xfrm rot="16200000">
+                  <a:off x="2924598" y="3676748"/>
+                  <a:ext cx="656802" cy="0"/>
+                </a:xfrm>
+                <a:prstGeom prst="line">
+                  <a:avLst/>
+                </a:prstGeom>
+                <a:ln>
+                  <a:solidFill>
+                    <a:schemeClr val="tx1"/>
+                  </a:solidFill>
+                  <a:prstDash val="lgDash"/>
+                </a:ln>
+              </p:spPr>
+              <p:style>
+                <a:lnRef idx="1">
+                  <a:schemeClr val="accent1"/>
+                </a:lnRef>
+                <a:fillRef idx="0">
+                  <a:schemeClr val="accent1"/>
+                </a:fillRef>
+                <a:effectRef idx="0">
+                  <a:schemeClr val="accent1"/>
+                </a:effectRef>
+                <a:fontRef idx="minor">
+                  <a:schemeClr val="tx1"/>
+                </a:fontRef>
+              </p:style>
+            </p:cxnSp>
+          </p:grpSp>
+          <p:cxnSp>
+            <p:nvCxnSpPr>
+              <p:cNvPr id="67" name="Straight Arrow Connector 66"/>
+              <p:cNvCxnSpPr>
+                <a:stCxn id="59" idx="0"/>
+              </p:cNvCxnSpPr>
+              <p:nvPr/>
+            </p:nvCxnSpPr>
+            <p:spPr>
+              <a:xfrm>
+                <a:off x="5477445" y="2893651"/>
+                <a:ext cx="1251756" cy="0"/>
+              </a:xfrm>
+              <a:prstGeom prst="straightConnector1">
+                <a:avLst/>
+              </a:prstGeom>
+              <a:ln w="38100">
+                <a:solidFill>
+                  <a:schemeClr val="bg1">
+                    <a:lumMod val="65000"/>
+                  </a:schemeClr>
+                </a:solidFill>
+                <a:tailEnd type="arrow"/>
+              </a:ln>
+            </p:spPr>
+            <p:style>
+              <a:lnRef idx="1">
+                <a:schemeClr val="accent1"/>
+              </a:lnRef>
+              <a:fillRef idx="0">
+                <a:schemeClr val="accent1"/>
+              </a:fillRef>
+              <a:effectRef idx="0">
+                <a:schemeClr val="accent1"/>
+              </a:effectRef>
+              <a:fontRef idx="minor">
+                <a:schemeClr val="tx1"/>
+              </a:fontRef>
+            </p:style>
+          </p:cxnSp>
+          <p:sp>
+            <p:nvSpPr>
+              <p:cNvPr id="68" name="TextBox 67"/>
+              <p:cNvSpPr txBox="1"/>
+              <p:nvPr/>
+            </p:nvSpPr>
+            <p:spPr>
+              <a:xfrm>
+                <a:off x="4873403" y="3308022"/>
+                <a:ext cx="878767" cy="338554"/>
+              </a:xfrm>
+              <a:prstGeom prst="rect">
+                <a:avLst/>
+              </a:prstGeom>
+              <a:noFill/>
+            </p:spPr>
+            <p:txBody>
+              <a:bodyPr wrap="none" rtlCol="0">
+                <a:spAutoFit/>
+              </a:bodyPr>
+              <a:lstStyle/>
+              <a:p>
+                <a:r>
+                  <a:rPr lang="en-CA" sz="1600" b="1" u="sng" smtClean="0"/>
+                  <a:t>position</a:t>
+                </a:r>
+                <a:endParaRPr lang="en-CA" sz="1600" b="1" u="sng"/>
+              </a:p>
+            </p:txBody>
+          </p:sp>
+          <p:sp>
+            <p:nvSpPr>
+              <p:cNvPr id="69" name="TextBox 68"/>
+              <p:cNvSpPr txBox="1"/>
+              <p:nvPr/>
+            </p:nvSpPr>
+            <p:spPr>
+              <a:xfrm>
+                <a:off x="6236895" y="3308022"/>
+                <a:ext cx="1090555" cy="338554"/>
+              </a:xfrm>
+              <a:prstGeom prst="rect">
+                <a:avLst/>
+              </a:prstGeom>
+              <a:noFill/>
+            </p:spPr>
+            <p:txBody>
+              <a:bodyPr wrap="none" rtlCol="0">
+                <a:spAutoFit/>
+              </a:bodyPr>
+              <a:lstStyle/>
+              <a:p>
+                <a:r>
+                  <a:rPr lang="en-CA" sz="1600" b="1" u="sng" smtClean="0"/>
+                  <a:t>focal point</a:t>
+                </a:r>
+                <a:endParaRPr lang="en-CA" sz="1600" b="1" u="sng"/>
+              </a:p>
+            </p:txBody>
+          </p:sp>
+          <p:grpSp>
+            <p:nvGrpSpPr>
+              <p:cNvPr id="70" name="Group 69"/>
+              <p:cNvGrpSpPr/>
+              <p:nvPr/>
+            </p:nvGrpSpPr>
+            <p:grpSpPr>
+              <a:xfrm rot="19227590">
+                <a:off x="5253424" y="2660670"/>
+                <a:ext cx="636270" cy="304800"/>
+                <a:chOff x="2133600" y="3505200"/>
+                <a:chExt cx="979170" cy="457200"/>
+              </a:xfrm>
+              <a:solidFill>
+                <a:schemeClr val="accent1"/>
+              </a:solidFill>
+            </p:grpSpPr>
+            <p:sp>
+              <p:nvSpPr>
+                <p:cNvPr id="71" name="Rectangle 70"/>
+                <p:cNvSpPr/>
+                <p:nvPr/>
+              </p:nvSpPr>
+              <p:spPr>
+                <a:xfrm>
+                  <a:off x="2133600" y="3505200"/>
+                  <a:ext cx="685800" cy="457200"/>
+                </a:xfrm>
+                <a:prstGeom prst="rect">
+                  <a:avLst/>
+                </a:prstGeom>
+                <a:solidFill>
+                  <a:schemeClr val="bg1">
+                    <a:lumMod val="50000"/>
+                  </a:schemeClr>
+                </a:solidFill>
+                <a:ln>
+                  <a:noFill/>
+                </a:ln>
+              </p:spPr>
+              <p:style>
+                <a:lnRef idx="2">
+                  <a:schemeClr val="accent1">
+                    <a:shade val="50000"/>
+                  </a:schemeClr>
+                </a:lnRef>
+                <a:fillRef idx="1">
+                  <a:schemeClr val="accent1"/>
+                </a:fillRef>
+                <a:effectRef idx="0">
+                  <a:schemeClr val="accent1"/>
+                </a:effectRef>
+                <a:fontRef idx="minor">
+                  <a:schemeClr val="lt1"/>
+                </a:fontRef>
+              </p:style>
+              <p:txBody>
+                <a:bodyPr rtlCol="0" anchor="ctr"/>
+                <a:lstStyle/>
+                <a:p>
+                  <a:pPr algn="ctr"/>
+                  <a:endParaRPr lang="en-CA" u="sng"/>
+                </a:p>
+              </p:txBody>
+            </p:sp>
+            <p:sp>
+              <p:nvSpPr>
+                <p:cNvPr id="72" name="Isosceles Triangle 71"/>
+                <p:cNvSpPr/>
+                <p:nvPr/>
+              </p:nvSpPr>
+              <p:spPr>
+                <a:xfrm rot="16200000">
+                  <a:off x="2655570" y="3505200"/>
+                  <a:ext cx="457200" cy="457200"/>
+                </a:xfrm>
+                <a:prstGeom prst="triangle">
+                  <a:avLst/>
+                </a:prstGeom>
+                <a:solidFill>
+                  <a:schemeClr val="bg1">
+                    <a:lumMod val="50000"/>
+                  </a:schemeClr>
+                </a:solidFill>
+                <a:ln>
+                  <a:noFill/>
+                </a:ln>
+              </p:spPr>
+              <p:style>
+                <a:lnRef idx="2">
+                  <a:schemeClr val="accent1">
+                    <a:shade val="50000"/>
+                  </a:schemeClr>
+                </a:lnRef>
+                <a:fillRef idx="1">
+                  <a:schemeClr val="accent1"/>
+                </a:fillRef>
+                <a:effectRef idx="0">
+                  <a:schemeClr val="accent1"/>
+                </a:effectRef>
+                <a:fontRef idx="minor">
+                  <a:schemeClr val="lt1"/>
+                </a:fontRef>
+              </p:style>
+              <p:txBody>
+                <a:bodyPr rtlCol="0" anchor="ctr"/>
+                <a:lstStyle/>
+                <a:p>
+                  <a:pPr algn="ctr"/>
+                  <a:endParaRPr lang="en-CA" u="sng"/>
+                </a:p>
+              </p:txBody>
+            </p:sp>
+          </p:grpSp>
+          <p:sp>
+            <p:nvSpPr>
+              <p:cNvPr id="78" name="Oval 77"/>
+              <p:cNvSpPr/>
+              <p:nvPr/>
+            </p:nvSpPr>
+            <p:spPr>
+              <a:xfrm>
+                <a:off x="6524728" y="1619039"/>
+                <a:ext cx="428202" cy="409597"/>
+              </a:xfrm>
+              <a:prstGeom prst="ellipse">
+                <a:avLst/>
+              </a:prstGeom>
+              <a:gradFill flip="none" rotWithShape="1">
+                <a:gsLst>
+                  <a:gs pos="0">
+                    <a:schemeClr val="accent5">
+                      <a:shade val="51000"/>
+                      <a:satMod val="130000"/>
+                    </a:schemeClr>
+                  </a:gs>
+                  <a:gs pos="80000">
+                    <a:schemeClr val="accent5">
+                      <a:shade val="93000"/>
+                      <a:satMod val="130000"/>
+                    </a:schemeClr>
+                  </a:gs>
+                  <a:gs pos="100000">
+                    <a:schemeClr val="accent5">
+                      <a:shade val="94000"/>
+                      <a:satMod val="135000"/>
+                    </a:schemeClr>
+                  </a:gs>
+                </a:gsLst>
+                <a:lin ang="13500000" scaled="1"/>
+                <a:tileRect/>
+              </a:gradFill>
+              <a:ln/>
+            </p:spPr>
+            <p:style>
+              <a:lnRef idx="1">
+                <a:schemeClr val="accent5"/>
+              </a:lnRef>
+              <a:fillRef idx="3">
+                <a:schemeClr val="accent5"/>
+              </a:fillRef>
+              <a:effectRef idx="2">
+                <a:schemeClr val="accent5"/>
+              </a:effectRef>
+              <a:fontRef idx="minor">
+                <a:schemeClr val="lt1"/>
+              </a:fontRef>
+            </p:style>
+            <p:txBody>
+              <a:bodyPr rtlCol="0" anchor="ctr"/>
+              <a:lstStyle/>
+              <a:p>
+                <a:pPr algn="ctr"/>
+                <a:endParaRPr lang="en-CA"/>
+              </a:p>
+            </p:txBody>
+          </p:sp>
+          <p:grpSp>
+            <p:nvGrpSpPr>
+              <p:cNvPr id="60" name="Group 59"/>
+              <p:cNvGrpSpPr/>
+              <p:nvPr/>
+            </p:nvGrpSpPr>
+            <p:grpSpPr>
+              <a:xfrm>
+                <a:off x="5128000" y="2565250"/>
+                <a:ext cx="656802" cy="656802"/>
+                <a:chOff x="2924598" y="3348347"/>
+                <a:chExt cx="656802" cy="656802"/>
+              </a:xfrm>
+            </p:grpSpPr>
+            <p:cxnSp>
+              <p:nvCxnSpPr>
+                <p:cNvPr id="61" name="Straight Connector 60"/>
+                <p:cNvCxnSpPr/>
+                <p:nvPr/>
+              </p:nvCxnSpPr>
+              <p:spPr>
+                <a:xfrm>
+                  <a:off x="2924598" y="3676747"/>
+                  <a:ext cx="656802" cy="0"/>
+                </a:xfrm>
+                <a:prstGeom prst="line">
+                  <a:avLst/>
+                </a:prstGeom>
+                <a:ln>
+                  <a:solidFill>
+                    <a:schemeClr val="tx1"/>
+                  </a:solidFill>
+                  <a:prstDash val="lgDash"/>
+                </a:ln>
+              </p:spPr>
+              <p:style>
+                <a:lnRef idx="1">
+                  <a:schemeClr val="accent1"/>
+                </a:lnRef>
+                <a:fillRef idx="0">
+                  <a:schemeClr val="accent1"/>
+                </a:fillRef>
+                <a:effectRef idx="0">
+                  <a:schemeClr val="accent1"/>
+                </a:effectRef>
+                <a:fontRef idx="minor">
+                  <a:schemeClr val="tx1"/>
+                </a:fontRef>
+              </p:style>
+            </p:cxnSp>
+            <p:cxnSp>
+              <p:nvCxnSpPr>
+                <p:cNvPr id="62" name="Straight Connector 61"/>
+                <p:cNvCxnSpPr/>
+                <p:nvPr/>
+              </p:nvCxnSpPr>
+              <p:spPr>
+                <a:xfrm rot="16200000">
+                  <a:off x="2924598" y="3676748"/>
+                  <a:ext cx="656802" cy="0"/>
+                </a:xfrm>
+                <a:prstGeom prst="line">
+                  <a:avLst/>
+                </a:prstGeom>
+                <a:ln>
+                  <a:solidFill>
+                    <a:schemeClr val="tx1"/>
+                  </a:solidFill>
+                  <a:prstDash val="lgDash"/>
+                </a:ln>
+              </p:spPr>
+              <p:style>
+                <a:lnRef idx="1">
+                  <a:schemeClr val="accent1"/>
+                </a:lnRef>
+                <a:fillRef idx="0">
+                  <a:schemeClr val="accent1"/>
+                </a:fillRef>
+                <a:effectRef idx="0">
+                  <a:schemeClr val="accent1"/>
+                </a:effectRef>
+                <a:fontRef idx="minor">
+                  <a:schemeClr val="tx1"/>
+                </a:fontRef>
+              </p:style>
+            </p:cxnSp>
+          </p:grpSp>
+          <p:sp>
+            <p:nvSpPr>
+              <p:cNvPr id="81" name="Circular Arrow 80"/>
+              <p:cNvSpPr/>
+              <p:nvPr/>
+            </p:nvSpPr>
+            <p:spPr>
+              <a:xfrm rot="5704428" flipH="1">
+                <a:off x="5618572" y="2150469"/>
+                <a:ext cx="969501" cy="1115804"/>
+              </a:xfrm>
+              <a:prstGeom prst="circularArrow">
+                <a:avLst>
+                  <a:gd name="adj1" fmla="val 13795"/>
+                  <a:gd name="adj2" fmla="val 1752037"/>
+                  <a:gd name="adj3" fmla="val 19072468"/>
+                  <a:gd name="adj4" fmla="val 16783505"/>
+                  <a:gd name="adj5" fmla="val 18734"/>
+                </a:avLst>
+              </a:prstGeom>
+            </p:spPr>
+            <p:style>
+              <a:lnRef idx="2">
+                <a:schemeClr val="accent6">
+                  <a:shade val="50000"/>
+                </a:schemeClr>
+              </a:lnRef>
+              <a:fillRef idx="1">
+                <a:schemeClr val="accent6"/>
+              </a:fillRef>
+              <a:effectRef idx="0">
+                <a:schemeClr val="accent6"/>
+              </a:effectRef>
+              <a:fontRef idx="minor">
+                <a:schemeClr val="lt1"/>
+              </a:fontRef>
+            </p:style>
+            <p:txBody>
+              <a:bodyPr rtlCol="0" anchor="ctr"/>
+              <a:lstStyle/>
+              <a:p>
+                <a:pPr algn="ctr"/>
+                <a:endParaRPr lang="en-CA" b="1">
+                  <a:solidFill>
+                    <a:schemeClr val="tx1"/>
+                  </a:solidFill>
+                </a:endParaRPr>
+              </a:p>
+            </p:txBody>
+          </p:sp>
+          <p:grpSp>
+            <p:nvGrpSpPr>
+              <p:cNvPr id="74" name="Group 73"/>
+              <p:cNvGrpSpPr/>
+              <p:nvPr/>
+            </p:nvGrpSpPr>
+            <p:grpSpPr>
+              <a:xfrm>
+                <a:off x="6400800" y="1485827"/>
+                <a:ext cx="656802" cy="656802"/>
+                <a:chOff x="2924598" y="3348347"/>
+                <a:chExt cx="656802" cy="656802"/>
+              </a:xfrm>
+            </p:grpSpPr>
+            <p:cxnSp>
+              <p:nvCxnSpPr>
+                <p:cNvPr id="75" name="Straight Connector 74"/>
+                <p:cNvCxnSpPr/>
+                <p:nvPr/>
+              </p:nvCxnSpPr>
+              <p:spPr>
+                <a:xfrm>
+                  <a:off x="2924598" y="3676747"/>
+                  <a:ext cx="656802" cy="0"/>
+                </a:xfrm>
+                <a:prstGeom prst="line">
+                  <a:avLst/>
+                </a:prstGeom>
+                <a:ln>
+                  <a:solidFill>
+                    <a:schemeClr val="tx1"/>
+                  </a:solidFill>
+                  <a:prstDash val="lgDash"/>
+                </a:ln>
+              </p:spPr>
+              <p:style>
+                <a:lnRef idx="1">
+                  <a:schemeClr val="accent1"/>
+                </a:lnRef>
+                <a:fillRef idx="0">
+                  <a:schemeClr val="accent1"/>
+                </a:fillRef>
+                <a:effectRef idx="0">
+                  <a:schemeClr val="accent1"/>
+                </a:effectRef>
+                <a:fontRef idx="minor">
+                  <a:schemeClr val="tx1"/>
+                </a:fontRef>
+              </p:style>
+            </p:cxnSp>
+            <p:cxnSp>
+              <p:nvCxnSpPr>
+                <p:cNvPr id="76" name="Straight Connector 75"/>
+                <p:cNvCxnSpPr/>
+                <p:nvPr/>
+              </p:nvCxnSpPr>
+              <p:spPr>
+                <a:xfrm rot="16200000">
+                  <a:off x="2924598" y="3676748"/>
+                  <a:ext cx="656802" cy="0"/>
+                </a:xfrm>
+                <a:prstGeom prst="line">
+                  <a:avLst/>
+                </a:prstGeom>
+                <a:ln>
+                  <a:solidFill>
+                    <a:schemeClr val="tx1"/>
+                  </a:solidFill>
+                  <a:prstDash val="lgDash"/>
+                </a:ln>
+              </p:spPr>
+              <p:style>
+                <a:lnRef idx="1">
+                  <a:schemeClr val="accent1"/>
+                </a:lnRef>
+                <a:fillRef idx="0">
+                  <a:schemeClr val="accent1"/>
+                </a:fillRef>
+                <a:effectRef idx="0">
+                  <a:schemeClr val="accent1"/>
+                </a:effectRef>
+                <a:fontRef idx="minor">
+                  <a:schemeClr val="tx1"/>
+                </a:fontRef>
+              </p:style>
+            </p:cxnSp>
+          </p:grpSp>
+          <p:cxnSp>
+            <p:nvCxnSpPr>
+              <p:cNvPr id="73" name="Straight Arrow Connector 72"/>
+              <p:cNvCxnSpPr/>
+              <p:nvPr/>
+            </p:nvCxnSpPr>
+            <p:spPr>
+              <a:xfrm flipV="1">
+                <a:off x="5477445" y="1837218"/>
+                <a:ext cx="1224465" cy="1056434"/>
+              </a:xfrm>
+              <a:prstGeom prst="straightConnector1">
+                <a:avLst/>
+              </a:prstGeom>
+              <a:ln w="38100">
+                <a:solidFill>
+                  <a:schemeClr val="accent6"/>
+                </a:solidFill>
+                <a:tailEnd type="arrow"/>
+              </a:ln>
+            </p:spPr>
+            <p:style>
+              <a:lnRef idx="1">
+                <a:schemeClr val="accent1"/>
+              </a:lnRef>
+              <a:fillRef idx="0">
+                <a:schemeClr val="accent1"/>
+              </a:fillRef>
+              <a:effectRef idx="0">
+                <a:schemeClr val="accent1"/>
+              </a:effectRef>
+              <a:fontRef idx="minor">
+                <a:schemeClr val="tx1"/>
+              </a:fontRef>
+            </p:style>
+          </p:cxnSp>
+        </p:grpSp>
+        <p:cxnSp>
+          <p:nvCxnSpPr>
+            <p:cNvPr id="91" name="Straight Connector 90"/>
+            <p:cNvCxnSpPr/>
+            <p:nvPr/>
+          </p:nvCxnSpPr>
+          <p:spPr>
+            <a:xfrm>
+              <a:off x="4419600" y="900946"/>
+              <a:ext cx="0" cy="4356854"/>
+            </a:xfrm>
+            <a:prstGeom prst="line">
+              <a:avLst/>
+            </a:prstGeom>
+            <a:ln>
+              <a:solidFill>
+                <a:schemeClr val="tx1">
+                  <a:lumMod val="90000"/>
+                  <a:lumOff val="10000"/>
+                </a:schemeClr>
+              </a:solidFill>
+              <a:prstDash val="lgDash"/>
+            </a:ln>
+          </p:spPr>
+          <p:style>
+            <a:lnRef idx="1">
+              <a:schemeClr val="accent1"/>
+            </a:lnRef>
+            <a:fillRef idx="0">
+              <a:schemeClr val="accent1"/>
+            </a:fillRef>
+            <a:effectRef idx="0">
+              <a:schemeClr val="accent1"/>
+            </a:effectRef>
+            <a:fontRef idx="minor">
+              <a:schemeClr val="tx1"/>
+            </a:fontRef>
+          </p:style>
+        </p:cxnSp>
+      </p:grpSp>
+    </p:spTree>
+    <p:extLst>
+      <p:ext uri="{BB962C8B-B14F-4D97-AF65-F5344CB8AC3E}">
+        <p14:creationId xmlns:p14="http://schemas.microsoft.com/office/powerpoint/2010/main" val="1368456715"/>
       </p:ext>
     </p:extLst>
   </p:cSld>

</xml_diff>